<commit_message>
Improvements for presentation and write up
</commit_message>
<xml_diff>
--- a/Social Buzz Analysis.pptx
+++ b/Social Buzz Analysis.pptx
@@ -19,7 +19,6 @@
     <p:sldId id="264" r:id="rId14"/>
     <p:sldId id="265" r:id="rId15"/>
     <p:sldId id="266" r:id="rId16"/>
-    <p:sldId id="267" r:id="rId17"/>
   </p:sldIdLst>
   <p:sldSz cy="10287000" cx="18288000"/>
   <p:notesSz cx="6858000" cy="9144000"/>
@@ -1779,7 +1778,7 @@
   <p:cSld>
     <p:spTree>
       <p:nvGrpSpPr>
-        <p:cNvPr id="389" name="Shape 389"/>
+        <p:cNvPr id="387" name="Shape 387"/>
         <p:cNvGrpSpPr/>
         <p:nvPr/>
       </p:nvGrpSpPr>
@@ -1793,7 +1792,7 @@
       </p:grpSpPr>
       <p:sp>
         <p:nvSpPr>
-          <p:cNvPr id="390" name="Google Shape;390;p9:notes"/>
+          <p:cNvPr id="388" name="Google Shape;388;p10:notes"/>
           <p:cNvSpPr txBox="1"/>
           <p:nvPr>
             <p:ph idx="2" type="hdr"/>
@@ -1844,7 +1843,7 @@
       </p:sp>
       <p:sp>
         <p:nvSpPr>
-          <p:cNvPr id="391" name="Google Shape;391;p9:notes"/>
+          <p:cNvPr id="389" name="Google Shape;389;p10:notes"/>
           <p:cNvSpPr txBox="1"/>
           <p:nvPr>
             <p:ph idx="10" type="dt"/>
@@ -1904,7 +1903,7 @@
       </p:sp>
       <p:sp>
         <p:nvSpPr>
-          <p:cNvPr id="392" name="Google Shape;392;p9:notes"/>
+          <p:cNvPr id="390" name="Google Shape;390;p10:notes"/>
           <p:cNvSpPr/>
           <p:nvPr>
             <p:ph idx="3" type="sldImg"/>
@@ -1949,7 +1948,7 @@
       </p:sp>
       <p:sp>
         <p:nvSpPr>
-          <p:cNvPr id="393" name="Google Shape;393;p9:notes"/>
+          <p:cNvPr id="391" name="Google Shape;391;p10:notes"/>
           <p:cNvSpPr txBox="1"/>
           <p:nvPr>
             <p:ph idx="1" type="body"/>
@@ -1992,7 +1991,7 @@
       </p:sp>
       <p:sp>
         <p:nvSpPr>
-          <p:cNvPr id="394" name="Google Shape;394;p9:notes"/>
+          <p:cNvPr id="392" name="Google Shape;392;p10:notes"/>
           <p:cNvSpPr txBox="1"/>
           <p:nvPr>
             <p:ph idx="11" type="ftr"/>
@@ -2043,7 +2042,7 @@
       </p:sp>
       <p:sp>
         <p:nvSpPr>
-          <p:cNvPr id="395" name="Google Shape;395;p9:notes"/>
+          <p:cNvPr id="393" name="Google Shape;393;p10:notes"/>
           <p:cNvSpPr txBox="1"/>
           <p:nvPr>
             <p:ph idx="12" type="sldNum"/>
@@ -2114,7 +2113,7 @@
   <p:cSld>
     <p:spTree>
       <p:nvGrpSpPr>
-        <p:cNvPr id="425" name="Shape 425"/>
+        <p:cNvPr id="417" name="Shape 417"/>
         <p:cNvGrpSpPr/>
         <p:nvPr/>
       </p:nvGrpSpPr>
@@ -2128,7 +2127,7 @@
       </p:grpSpPr>
       <p:sp>
         <p:nvSpPr>
-          <p:cNvPr id="426" name="Google Shape;426;p10:notes"/>
+          <p:cNvPr id="418" name="Google Shape;418;p11:notes"/>
           <p:cNvSpPr txBox="1"/>
           <p:nvPr>
             <p:ph idx="2" type="hdr"/>
@@ -2179,7 +2178,7 @@
       </p:sp>
       <p:sp>
         <p:nvSpPr>
-          <p:cNvPr id="427" name="Google Shape;427;p10:notes"/>
+          <p:cNvPr id="419" name="Google Shape;419;p11:notes"/>
           <p:cNvSpPr txBox="1"/>
           <p:nvPr>
             <p:ph idx="10" type="dt"/>
@@ -2239,7 +2238,7 @@
       </p:sp>
       <p:sp>
         <p:nvSpPr>
-          <p:cNvPr id="428" name="Google Shape;428;p10:notes"/>
+          <p:cNvPr id="420" name="Google Shape;420;p11:notes"/>
           <p:cNvSpPr/>
           <p:nvPr>
             <p:ph idx="3" type="sldImg"/>
@@ -2284,7 +2283,7 @@
       </p:sp>
       <p:sp>
         <p:nvSpPr>
-          <p:cNvPr id="429" name="Google Shape;429;p10:notes"/>
+          <p:cNvPr id="421" name="Google Shape;421;p11:notes"/>
           <p:cNvSpPr txBox="1"/>
           <p:nvPr>
             <p:ph idx="1" type="body"/>
@@ -2327,7 +2326,7 @@
       </p:sp>
       <p:sp>
         <p:nvSpPr>
-          <p:cNvPr id="430" name="Google Shape;430;p10:notes"/>
+          <p:cNvPr id="422" name="Google Shape;422;p11:notes"/>
           <p:cNvSpPr txBox="1"/>
           <p:nvPr>
             <p:ph idx="11" type="ftr"/>
@@ -2378,342 +2377,7 @@
       </p:sp>
       <p:sp>
         <p:nvSpPr>
-          <p:cNvPr id="431" name="Google Shape;431;p10:notes"/>
-          <p:cNvSpPr txBox="1"/>
-          <p:nvPr>
-            <p:ph idx="12" type="sldNum"/>
-          </p:nvPr>
-        </p:nvSpPr>
-        <p:spPr>
-          <a:xfrm>
-            <a:off x="5180013" y="6502400"/>
-            <a:ext cx="3962400" cy="341400"/>
-          </a:xfrm>
-          <a:prstGeom prst="rect">
-            <a:avLst/>
-          </a:prstGeom>
-          <a:noFill/>
-          <a:ln>
-            <a:noFill/>
-          </a:ln>
-        </p:spPr>
-        <p:txBody>
-          <a:bodyPr anchorCtr="0" anchor="b" bIns="45700" lIns="91425" spcFirstLastPara="1" rIns="91425" wrap="square" tIns="45700">
-            <a:noAutofit/>
-          </a:bodyPr>
-          <a:lstStyle/>
-          <a:p>
-            <a:pPr indent="0" lvl="0" marL="0" rtl="0" algn="r">
-              <a:spcBef>
-                <a:spcPts val="0"/>
-              </a:spcBef>
-              <a:spcAft>
-                <a:spcPts val="0"/>
-              </a:spcAft>
-              <a:buNone/>
-            </a:pPr>
-            <a:fld id="{00000000-1234-1234-1234-123412341234}" type="slidenum">
-              <a:rPr lang="cs-CZ" sz="1200">
-                <a:solidFill>
-                  <a:schemeClr val="dk1"/>
-                </a:solidFill>
-                <a:latin typeface="Calibri"/>
-                <a:ea typeface="Calibri"/>
-                <a:cs typeface="Calibri"/>
-                <a:sym typeface="Calibri"/>
-              </a:rPr>
-              <a:t>‹#›</a:t>
-            </a:fld>
-            <a:endParaRPr sz="1200">
-              <a:solidFill>
-                <a:schemeClr val="dk1"/>
-              </a:solidFill>
-              <a:latin typeface="Calibri"/>
-              <a:ea typeface="Calibri"/>
-              <a:cs typeface="Calibri"/>
-              <a:sym typeface="Calibri"/>
-            </a:endParaRPr>
-          </a:p>
-        </p:txBody>
-      </p:sp>
-    </p:spTree>
-  </p:cSld>
-  <p:clrMapOvr>
-    <a:masterClrMapping/>
-  </p:clrMapOvr>
-</p:notes>
-</file>
-
-<file path=ppt/notesSlides/notesSlide12.xml><?xml version="1.0" encoding="utf-8"?>
-<p:notes xmlns:a="http://schemas.openxmlformats.org/drawingml/2006/main" xmlns:r="http://schemas.openxmlformats.org/officeDocument/2006/relationships" xmlns:mc="http://schemas.openxmlformats.org/markup-compatibility/2006" xmlns:mv="urn:schemas-microsoft-com:mac:vml" xmlns:p="http://schemas.openxmlformats.org/presentationml/2006/main" xmlns:c="http://schemas.openxmlformats.org/drawingml/2006/chart" xmlns:dgm="http://schemas.openxmlformats.org/drawingml/2006/diagram" xmlns:o="urn:schemas-microsoft-com:office:office" xmlns:v="urn:schemas-microsoft-com:vml" xmlns:pvml="urn:schemas-microsoft-com:office:powerpoint" xmlns:com="http://schemas.openxmlformats.org/drawingml/2006/compatibility" xmlns:p14="http://schemas.microsoft.com/office/powerpoint/2010/main" xmlns:p15="http://schemas.microsoft.com/office/powerpoint/2012/main" xmlns:ahyp="http://schemas.microsoft.com/office/drawing/2018/hyperlinkcolor" showMasterPhAnim="0" showMasterSp="0">
-  <p:cSld>
-    <p:spTree>
-      <p:nvGrpSpPr>
-        <p:cNvPr id="455" name="Shape 455"/>
-        <p:cNvGrpSpPr/>
-        <p:nvPr/>
-      </p:nvGrpSpPr>
-      <p:grpSpPr>
-        <a:xfrm>
-          <a:off x="0" y="0"/>
-          <a:ext cx="0" cy="0"/>
-          <a:chOff x="0" y="0"/>
-          <a:chExt cx="0" cy="0"/>
-        </a:xfrm>
-      </p:grpSpPr>
-      <p:sp>
-        <p:nvSpPr>
-          <p:cNvPr id="456" name="Google Shape;456;p11:notes"/>
-          <p:cNvSpPr txBox="1"/>
-          <p:nvPr>
-            <p:ph idx="2" type="hdr"/>
-          </p:nvPr>
-        </p:nvSpPr>
-        <p:spPr>
-          <a:xfrm>
-            <a:off x="0" y="0"/>
-            <a:ext cx="3962400" cy="342900"/>
-          </a:xfrm>
-          <a:prstGeom prst="rect">
-            <a:avLst/>
-          </a:prstGeom>
-          <a:noFill/>
-          <a:ln>
-            <a:noFill/>
-          </a:ln>
-        </p:spPr>
-        <p:txBody>
-          <a:bodyPr anchorCtr="0" anchor="t" bIns="45700" lIns="91425" spcFirstLastPara="1" rIns="91425" wrap="square" tIns="45700">
-            <a:noAutofit/>
-          </a:bodyPr>
-          <a:lstStyle/>
-          <a:p>
-            <a:pPr indent="0" lvl="0" marL="0" rtl="0" algn="l">
-              <a:spcBef>
-                <a:spcPts val="0"/>
-              </a:spcBef>
-              <a:spcAft>
-                <a:spcPts val="0"/>
-              </a:spcAft>
-              <a:buNone/>
-            </a:pPr>
-            <a:r>
-              <a:t/>
-            </a:r>
-            <a:endParaRPr sz="1200">
-              <a:solidFill>
-                <a:schemeClr val="dk1"/>
-              </a:solidFill>
-              <a:latin typeface="Calibri"/>
-              <a:ea typeface="Calibri"/>
-              <a:cs typeface="Calibri"/>
-              <a:sym typeface="Calibri"/>
-            </a:endParaRPr>
-          </a:p>
-        </p:txBody>
-      </p:sp>
-      <p:sp>
-        <p:nvSpPr>
-          <p:cNvPr id="457" name="Google Shape;457;p11:notes"/>
-          <p:cNvSpPr txBox="1"/>
-          <p:nvPr>
-            <p:ph idx="10" type="dt"/>
-          </p:nvPr>
-        </p:nvSpPr>
-        <p:spPr>
-          <a:xfrm>
-            <a:off x="5180013" y="0"/>
-            <a:ext cx="3962400" cy="342900"/>
-          </a:xfrm>
-          <a:prstGeom prst="rect">
-            <a:avLst/>
-          </a:prstGeom>
-          <a:noFill/>
-          <a:ln>
-            <a:noFill/>
-          </a:ln>
-        </p:spPr>
-        <p:txBody>
-          <a:bodyPr anchorCtr="0" anchor="t" bIns="45700" lIns="91425" spcFirstLastPara="1" rIns="91425" wrap="square" tIns="45700">
-            <a:noAutofit/>
-          </a:bodyPr>
-          <a:lstStyle/>
-          <a:p>
-            <a:pPr indent="0" lvl="0" marL="0" rtl="0" algn="r">
-              <a:spcBef>
-                <a:spcPts val="0"/>
-              </a:spcBef>
-              <a:spcAft>
-                <a:spcPts val="0"/>
-              </a:spcAft>
-              <a:buNone/>
-            </a:pPr>
-            <a:r>
-              <a:rPr lang="cs-CZ" sz="1200">
-                <a:solidFill>
-                  <a:schemeClr val="dk1"/>
-                </a:solidFill>
-                <a:latin typeface="Calibri"/>
-                <a:ea typeface="Calibri"/>
-                <a:cs typeface="Calibri"/>
-                <a:sym typeface="Calibri"/>
-              </a:rPr>
-              <a:t>30.09.2022</a:t>
-            </a:r>
-            <a:endParaRPr sz="1200">
-              <a:solidFill>
-                <a:schemeClr val="dk1"/>
-              </a:solidFill>
-              <a:latin typeface="Calibri"/>
-              <a:ea typeface="Calibri"/>
-              <a:cs typeface="Calibri"/>
-              <a:sym typeface="Calibri"/>
-            </a:endParaRPr>
-          </a:p>
-        </p:txBody>
-      </p:sp>
-      <p:sp>
-        <p:nvSpPr>
-          <p:cNvPr id="458" name="Google Shape;458;p11:notes"/>
-          <p:cNvSpPr/>
-          <p:nvPr>
-            <p:ph idx="3" type="sldImg"/>
-          </p:nvPr>
-        </p:nvSpPr>
-        <p:spPr>
-          <a:xfrm>
-            <a:off x="2290763" y="512763"/>
-            <a:ext cx="4562400" cy="2567100"/>
-          </a:xfrm>
-          <a:custGeom>
-            <a:rect b="b" l="l" r="r" t="t"/>
-            <a:pathLst>
-              <a:path extrusionOk="0" h="120000" w="120000">
-                <a:moveTo>
-                  <a:pt x="0" y="0"/>
-                </a:moveTo>
-                <a:lnTo>
-                  <a:pt x="120000" y="0"/>
-                </a:lnTo>
-                <a:lnTo>
-                  <a:pt x="120000" y="120000"/>
-                </a:lnTo>
-                <a:lnTo>
-                  <a:pt x="0" y="120000"/>
-                </a:lnTo>
-                <a:close/>
-              </a:path>
-            </a:pathLst>
-          </a:custGeom>
-          <a:noFill/>
-          <a:ln cap="flat" cmpd="sng" w="12700">
-            <a:solidFill>
-              <a:srgbClr val="000000"/>
-            </a:solidFill>
-            <a:prstDash val="solid"/>
-            <a:round/>
-            <a:headEnd len="sm" w="sm" type="none"/>
-            <a:tailEnd len="sm" w="sm" type="none"/>
-          </a:ln>
-        </p:spPr>
-      </p:sp>
-      <p:sp>
-        <p:nvSpPr>
-          <p:cNvPr id="459" name="Google Shape;459;p11:notes"/>
-          <p:cNvSpPr txBox="1"/>
-          <p:nvPr>
-            <p:ph idx="1" type="body"/>
-          </p:nvPr>
-        </p:nvSpPr>
-        <p:spPr>
-          <a:xfrm>
-            <a:off x="914400" y="3251200"/>
-            <a:ext cx="7315200" cy="3081300"/>
-          </a:xfrm>
-          <a:prstGeom prst="rect">
-            <a:avLst/>
-          </a:prstGeom>
-          <a:noFill/>
-          <a:ln>
-            <a:noFill/>
-          </a:ln>
-        </p:spPr>
-        <p:txBody>
-          <a:bodyPr anchorCtr="0" anchor="t" bIns="45700" lIns="91425" spcFirstLastPara="1" rIns="91425" wrap="square" tIns="45700">
-            <a:noAutofit/>
-          </a:bodyPr>
-          <a:lstStyle/>
-          <a:p>
-            <a:pPr indent="0" lvl="0" marL="0" rtl="0" algn="l">
-              <a:spcBef>
-                <a:spcPts val="0"/>
-              </a:spcBef>
-              <a:spcAft>
-                <a:spcPts val="0"/>
-              </a:spcAft>
-              <a:buNone/>
-            </a:pPr>
-            <a:r>
-              <a:t/>
-            </a:r>
-            <a:endParaRPr/>
-          </a:p>
-        </p:txBody>
-      </p:sp>
-      <p:sp>
-        <p:nvSpPr>
-          <p:cNvPr id="460" name="Google Shape;460;p11:notes"/>
-          <p:cNvSpPr txBox="1"/>
-          <p:nvPr>
-            <p:ph idx="11" type="ftr"/>
-          </p:nvPr>
-        </p:nvSpPr>
-        <p:spPr>
-          <a:xfrm>
-            <a:off x="0" y="6502400"/>
-            <a:ext cx="3962400" cy="341400"/>
-          </a:xfrm>
-          <a:prstGeom prst="rect">
-            <a:avLst/>
-          </a:prstGeom>
-          <a:noFill/>
-          <a:ln>
-            <a:noFill/>
-          </a:ln>
-        </p:spPr>
-        <p:txBody>
-          <a:bodyPr anchorCtr="0" anchor="b" bIns="45700" lIns="91425" spcFirstLastPara="1" rIns="91425" wrap="square" tIns="45700">
-            <a:noAutofit/>
-          </a:bodyPr>
-          <a:lstStyle/>
-          <a:p>
-            <a:pPr indent="0" lvl="0" marL="0" rtl="0" algn="l">
-              <a:spcBef>
-                <a:spcPts val="0"/>
-              </a:spcBef>
-              <a:spcAft>
-                <a:spcPts val="0"/>
-              </a:spcAft>
-              <a:buNone/>
-            </a:pPr>
-            <a:r>
-              <a:t/>
-            </a:r>
-            <a:endParaRPr sz="1200">
-              <a:solidFill>
-                <a:schemeClr val="dk1"/>
-              </a:solidFill>
-              <a:latin typeface="Calibri"/>
-              <a:ea typeface="Calibri"/>
-              <a:cs typeface="Calibri"/>
-              <a:sym typeface="Calibri"/>
-            </a:endParaRPr>
-          </a:p>
-        </p:txBody>
-      </p:sp>
-      <p:sp>
-        <p:nvSpPr>
-          <p:cNvPr id="461" name="Google Shape;461;p11:notes"/>
+          <p:cNvPr id="423" name="Google Shape;423;p11:notes"/>
           <p:cNvSpPr txBox="1"/>
           <p:nvPr>
             <p:ph idx="12" type="sldNum"/>
@@ -4664,7 +4328,16 @@
               <a:buNone/>
             </a:pPr>
             <a:r>
-              <a:t/>
+              <a:rPr lang="cs-CZ"/>
+              <a:t>6:00 AM followed second with most posts </a:t>
+            </a:r>
+            <a:r>
+              <a:rPr lang="cs-CZ"/>
+              <a:t>behind</a:t>
+            </a:r>
+            <a:r>
+              <a:rPr lang="cs-CZ"/>
+              <a:t> by only 1.</a:t>
             </a:r>
             <a:endParaRPr/>
           </a:p>
@@ -4794,7 +4467,7 @@
   <p:cSld>
     <p:spTree>
       <p:nvGrpSpPr>
-        <p:cNvPr id="316" name="Shape 316"/>
+        <p:cNvPr id="319" name="Shape 319"/>
         <p:cNvGrpSpPr/>
         <p:nvPr/>
       </p:nvGrpSpPr>
@@ -4808,7 +4481,7 @@
       </p:grpSpPr>
       <p:sp>
         <p:nvSpPr>
-          <p:cNvPr id="317" name="Google Shape;317;p8:notes"/>
+          <p:cNvPr id="320" name="Google Shape;320;p8:notes"/>
           <p:cNvSpPr txBox="1"/>
           <p:nvPr>
             <p:ph idx="2" type="hdr"/>
@@ -4859,7 +4532,7 @@
       </p:sp>
       <p:sp>
         <p:nvSpPr>
-          <p:cNvPr id="318" name="Google Shape;318;p8:notes"/>
+          <p:cNvPr id="321" name="Google Shape;321;p8:notes"/>
           <p:cNvSpPr txBox="1"/>
           <p:nvPr>
             <p:ph idx="10" type="dt"/>
@@ -4919,7 +4592,7 @@
       </p:sp>
       <p:sp>
         <p:nvSpPr>
-          <p:cNvPr id="319" name="Google Shape;319;p8:notes"/>
+          <p:cNvPr id="322" name="Google Shape;322;p8:notes"/>
           <p:cNvSpPr/>
           <p:nvPr>
             <p:ph idx="3" type="sldImg"/>
@@ -4964,7 +4637,7 @@
       </p:sp>
       <p:sp>
         <p:nvSpPr>
-          <p:cNvPr id="320" name="Google Shape;320;p8:notes"/>
+          <p:cNvPr id="323" name="Google Shape;323;p8:notes"/>
           <p:cNvSpPr txBox="1"/>
           <p:nvPr>
             <p:ph idx="1" type="body"/>
@@ -4996,18 +4669,82 @@
               <a:spcAft>
                 <a:spcPts val="0"/>
               </a:spcAft>
+              <a:buSzPts val="1100"/>
+              <a:buNone/>
+            </a:pPr>
+            <a:r>
+              <a:rPr lang="cs-CZ" sz="1300">
+                <a:latin typeface="Arial"/>
+                <a:ea typeface="Arial"/>
+                <a:cs typeface="Arial"/>
+                <a:sym typeface="Arial"/>
+              </a:rPr>
+              <a:t>Top 5 categories all nearly reach or exceed 50,000 in popularity score. Travel being the highest at 53,935 in popularity score</a:t>
+            </a:r>
+            <a:endParaRPr sz="1300">
+              <a:latin typeface="Arial"/>
+              <a:ea typeface="Arial"/>
+              <a:cs typeface="Arial"/>
+              <a:sym typeface="Arial"/>
+            </a:endParaRPr>
+          </a:p>
+          <a:p>
+            <a:pPr indent="0" lvl="0" marL="0" rtl="0" algn="l">
+              <a:spcBef>
+                <a:spcPts val="0"/>
+              </a:spcBef>
+              <a:spcAft>
+                <a:spcPts val="0"/>
+              </a:spcAft>
+              <a:buSzPts val="1100"/>
               <a:buNone/>
             </a:pPr>
             <a:r>
               <a:t/>
             </a:r>
-            <a:endParaRPr/>
+            <a:endParaRPr sz="1300">
+              <a:latin typeface="Arial"/>
+              <a:ea typeface="Arial"/>
+              <a:cs typeface="Arial"/>
+              <a:sym typeface="Arial"/>
+            </a:endParaRPr>
+          </a:p>
+          <a:p>
+            <a:pPr indent="0" lvl="0" marL="0" rtl="0" algn="l">
+              <a:spcBef>
+                <a:spcPts val="0"/>
+              </a:spcBef>
+              <a:spcAft>
+                <a:spcPts val="0"/>
+              </a:spcAft>
+              <a:buClr>
+                <a:schemeClr val="dk1"/>
+              </a:buClr>
+              <a:buSzPts val="1100"/>
+              <a:buFont typeface="Arial"/>
+              <a:buNone/>
+            </a:pPr>
+            <a:r>
+              <a:rPr lang="cs-CZ" sz="1300">
+                <a:latin typeface="Arial"/>
+                <a:ea typeface="Arial"/>
+                <a:cs typeface="Arial"/>
+                <a:sym typeface="Arial"/>
+              </a:rPr>
+              <a:t>Popular categories perform almost similar in reaction types. However, healthy eating and science is higher in positive reactions by 1-2%. Also have lowest % of negative reaction by 3%</a:t>
+            </a:r>
+            <a:endParaRPr sz="1300">
+              <a:latin typeface="Arial"/>
+              <a:ea typeface="Arial"/>
+              <a:cs typeface="Arial"/>
+              <a:sym typeface="Arial"/>
+            </a:endParaRPr>
           </a:p>
         </p:txBody>
       </p:sp>
       <p:sp>
         <p:nvSpPr>
-          <p:cNvPr id="321" name="Google Shape;321;p8:notes"/>
+          <p:cNvPr id="324" name="Google Shape;324;p8:notes"/>
           <p:cNvSpPr txBox="1"/>
           <p:nvPr>
             <p:ph idx="11" type="ftr"/>
@@ -5058,7 +4795,7 @@
       </p:sp>
       <p:sp>
         <p:nvSpPr>
-          <p:cNvPr id="322" name="Google Shape;322;p8:notes"/>
+          <p:cNvPr id="325" name="Google Shape;325;p8:notes"/>
           <p:cNvSpPr txBox="1"/>
           <p:nvPr>
             <p:ph idx="12" type="sldNum"/>
@@ -5129,7 +4866,7 @@
   <p:cSld>
     <p:spTree>
       <p:nvGrpSpPr>
-        <p:cNvPr id="352" name="Shape 352"/>
+        <p:cNvPr id="353" name="Shape 353"/>
         <p:cNvGrpSpPr/>
         <p:nvPr/>
       </p:nvGrpSpPr>
@@ -5143,7 +4880,7 @@
       </p:grpSpPr>
       <p:sp>
         <p:nvSpPr>
-          <p:cNvPr id="353" name="Google Shape;353;g30ed893717e_0_3:notes"/>
+          <p:cNvPr id="354" name="Google Shape;354;g30ed893717e_0_3:notes"/>
           <p:cNvSpPr txBox="1"/>
           <p:nvPr>
             <p:ph idx="2" type="hdr"/>
@@ -5194,7 +4931,7 @@
       </p:sp>
       <p:sp>
         <p:nvSpPr>
-          <p:cNvPr id="354" name="Google Shape;354;g30ed893717e_0_3:notes"/>
+          <p:cNvPr id="355" name="Google Shape;355;g30ed893717e_0_3:notes"/>
           <p:cNvSpPr txBox="1"/>
           <p:nvPr>
             <p:ph idx="10" type="dt"/>
@@ -5254,7 +4991,7 @@
       </p:sp>
       <p:sp>
         <p:nvSpPr>
-          <p:cNvPr id="355" name="Google Shape;355;g30ed893717e_0_3:notes"/>
+          <p:cNvPr id="356" name="Google Shape;356;g30ed893717e_0_3:notes"/>
           <p:cNvSpPr/>
           <p:nvPr>
             <p:ph idx="3" type="sldImg"/>
@@ -5299,7 +5036,7 @@
       </p:sp>
       <p:sp>
         <p:nvSpPr>
-          <p:cNvPr id="356" name="Google Shape;356;g30ed893717e_0_3:notes"/>
+          <p:cNvPr id="357" name="Google Shape;357;g30ed893717e_0_3:notes"/>
           <p:cNvSpPr txBox="1"/>
           <p:nvPr>
             <p:ph idx="1" type="body"/>
@@ -5331,18 +5068,30 @@
               <a:spcAft>
                 <a:spcPts val="0"/>
               </a:spcAft>
+              <a:buSzPts val="1100"/>
               <a:buNone/>
             </a:pPr>
             <a:r>
-              <a:t/>
+              <a:rPr lang="cs-CZ" sz="1300">
+                <a:latin typeface="Arial"/>
+                <a:ea typeface="Arial"/>
+                <a:cs typeface="Arial"/>
+                <a:sym typeface="Arial"/>
+              </a:rPr>
+              <a:t>Photo is highest in popularity</a:t>
             </a:r>
-            <a:endParaRPr/>
+            <a:endParaRPr sz="1300">
+              <a:latin typeface="Arial"/>
+              <a:ea typeface="Arial"/>
+              <a:cs typeface="Arial"/>
+              <a:sym typeface="Arial"/>
+            </a:endParaRPr>
           </a:p>
         </p:txBody>
       </p:sp>
       <p:sp>
         <p:nvSpPr>
-          <p:cNvPr id="357" name="Google Shape;357;g30ed893717e_0_3:notes"/>
+          <p:cNvPr id="358" name="Google Shape;358;g30ed893717e_0_3:notes"/>
           <p:cNvSpPr txBox="1"/>
           <p:nvPr>
             <p:ph idx="11" type="ftr"/>
@@ -5393,7 +5142,7 @@
       </p:sp>
       <p:sp>
         <p:nvSpPr>
-          <p:cNvPr id="358" name="Google Shape;358;g30ed893717e_0_3:notes"/>
+          <p:cNvPr id="359" name="Google Shape;359;g30ed893717e_0_3:notes"/>
           <p:cNvSpPr txBox="1"/>
           <p:nvPr>
             <p:ph idx="12" type="sldNum"/>
@@ -15579,8 +15328,8 @@
           <a:xfrm>
             <a:off x="1104899" y="824285"/>
             <a:ext cx="8750844" cy="8318193"/>
-            <a:chOff x="-1" y="-1"/>
-            <a:chExt cx="11667792" cy="11090924"/>
+            <a:chOff x="-1" y="0"/>
+            <a:chExt cx="11667792" cy="11090923"/>
           </a:xfrm>
         </p:grpSpPr>
         <p:sp>
@@ -15677,8 +15426,8 @@
           </p:blipFill>
           <p:spPr>
             <a:xfrm rot="-5115457">
-              <a:off x="396140" y="376277"/>
-              <a:ext cx="9735956" cy="9756713"/>
+              <a:off x="396140" y="376276"/>
+              <a:ext cx="9735956" cy="9756714"/>
             </a:xfrm>
             <a:prstGeom prst="rect">
               <a:avLst/>
@@ -15752,915 +15501,7 @@
   <p:cSld>
     <p:spTree>
       <p:nvGrpSpPr>
-        <p:cNvPr id="396" name="Shape 396"/>
-        <p:cNvGrpSpPr/>
-        <p:nvPr/>
-      </p:nvGrpSpPr>
-      <p:grpSpPr>
-        <a:xfrm>
-          <a:off x="0" y="0"/>
-          <a:ext cx="0" cy="0"/>
-          <a:chOff x="0" y="0"/>
-          <a:chExt cx="0" cy="0"/>
-        </a:xfrm>
-      </p:grpSpPr>
-      <p:grpSp>
-        <p:nvGrpSpPr>
-          <p:cNvPr id="397" name="Google Shape;397;p22"/>
-          <p:cNvGrpSpPr/>
-          <p:nvPr/>
-        </p:nvGrpSpPr>
-        <p:grpSpPr>
-          <a:xfrm>
-            <a:off x="555213" y="9490985"/>
-            <a:ext cx="17253775" cy="2017080"/>
-            <a:chOff x="0" y="0"/>
-            <a:chExt cx="23005033" cy="2689440"/>
-          </a:xfrm>
-        </p:grpSpPr>
-        <p:pic>
-          <p:nvPicPr>
-            <p:cNvPr id="398" name="Google Shape;398;p22"/>
-            <p:cNvPicPr preferRelativeResize="0"/>
-            <p:nvPr/>
-          </p:nvPicPr>
-          <p:blipFill rotWithShape="1">
-            <a:blip r:embed="rId3">
-              <a:alphaModFix amt="80000"/>
-            </a:blip>
-            <a:srcRect b="0" l="0" r="0" t="0"/>
-            <a:stretch/>
-          </p:blipFill>
-          <p:spPr>
-            <a:xfrm>
-              <a:off x="16760969" y="0"/>
-              <a:ext cx="2891870" cy="2689440"/>
-            </a:xfrm>
-            <a:prstGeom prst="rect">
-              <a:avLst/>
-            </a:prstGeom>
-            <a:noFill/>
-            <a:ln>
-              <a:noFill/>
-            </a:ln>
-          </p:spPr>
-        </p:pic>
-        <p:pic>
-          <p:nvPicPr>
-            <p:cNvPr id="399" name="Google Shape;399;p22"/>
-            <p:cNvPicPr preferRelativeResize="0"/>
-            <p:nvPr/>
-          </p:nvPicPr>
-          <p:blipFill rotWithShape="1">
-            <a:blip r:embed="rId3">
-              <a:alphaModFix amt="80000"/>
-            </a:blip>
-            <a:srcRect b="0" l="0" r="0" t="0"/>
-            <a:stretch/>
-          </p:blipFill>
-          <p:spPr>
-            <a:xfrm>
-              <a:off x="13408776" y="0"/>
-              <a:ext cx="2891870" cy="2689440"/>
-            </a:xfrm>
-            <a:prstGeom prst="rect">
-              <a:avLst/>
-            </a:prstGeom>
-            <a:noFill/>
-            <a:ln>
-              <a:noFill/>
-            </a:ln>
-          </p:spPr>
-        </p:pic>
-        <p:pic>
-          <p:nvPicPr>
-            <p:cNvPr id="400" name="Google Shape;400;p22"/>
-            <p:cNvPicPr preferRelativeResize="0"/>
-            <p:nvPr/>
-          </p:nvPicPr>
-          <p:blipFill rotWithShape="1">
-            <a:blip r:embed="rId3">
-              <a:alphaModFix amt="80000"/>
-            </a:blip>
-            <a:srcRect b="0" l="0" r="0" t="0"/>
-            <a:stretch/>
-          </p:blipFill>
-          <p:spPr>
-            <a:xfrm>
-              <a:off x="10056582" y="0"/>
-              <a:ext cx="2891870" cy="2689440"/>
-            </a:xfrm>
-            <a:prstGeom prst="rect">
-              <a:avLst/>
-            </a:prstGeom>
-            <a:noFill/>
-            <a:ln>
-              <a:noFill/>
-            </a:ln>
-          </p:spPr>
-        </p:pic>
-        <p:pic>
-          <p:nvPicPr>
-            <p:cNvPr id="401" name="Google Shape;401;p22"/>
-            <p:cNvPicPr preferRelativeResize="0"/>
-            <p:nvPr/>
-          </p:nvPicPr>
-          <p:blipFill rotWithShape="1">
-            <a:blip r:embed="rId3">
-              <a:alphaModFix amt="80000"/>
-            </a:blip>
-            <a:srcRect b="0" l="0" r="0" t="0"/>
-            <a:stretch/>
-          </p:blipFill>
-          <p:spPr>
-            <a:xfrm>
-              <a:off x="20113163" y="0"/>
-              <a:ext cx="2891870" cy="2689440"/>
-            </a:xfrm>
-            <a:prstGeom prst="rect">
-              <a:avLst/>
-            </a:prstGeom>
-            <a:noFill/>
-            <a:ln>
-              <a:noFill/>
-            </a:ln>
-          </p:spPr>
-        </p:pic>
-        <p:pic>
-          <p:nvPicPr>
-            <p:cNvPr id="402" name="Google Shape;402;p22"/>
-            <p:cNvPicPr preferRelativeResize="0"/>
-            <p:nvPr/>
-          </p:nvPicPr>
-          <p:blipFill rotWithShape="1">
-            <a:blip r:embed="rId3">
-              <a:alphaModFix amt="80000"/>
-            </a:blip>
-            <a:srcRect b="0" l="0" r="0" t="0"/>
-            <a:stretch/>
-          </p:blipFill>
-          <p:spPr>
-            <a:xfrm>
-              <a:off x="6704388" y="0"/>
-              <a:ext cx="2891870" cy="2689440"/>
-            </a:xfrm>
-            <a:prstGeom prst="rect">
-              <a:avLst/>
-            </a:prstGeom>
-            <a:noFill/>
-            <a:ln>
-              <a:noFill/>
-            </a:ln>
-          </p:spPr>
-        </p:pic>
-        <p:pic>
-          <p:nvPicPr>
-            <p:cNvPr id="403" name="Google Shape;403;p22"/>
-            <p:cNvPicPr preferRelativeResize="0"/>
-            <p:nvPr/>
-          </p:nvPicPr>
-          <p:blipFill rotWithShape="1">
-            <a:blip r:embed="rId3">
-              <a:alphaModFix amt="80000"/>
-            </a:blip>
-            <a:srcRect b="0" l="0" r="0" t="0"/>
-            <a:stretch/>
-          </p:blipFill>
-          <p:spPr>
-            <a:xfrm>
-              <a:off x="3352194" y="0"/>
-              <a:ext cx="2891870" cy="2689440"/>
-            </a:xfrm>
-            <a:prstGeom prst="rect">
-              <a:avLst/>
-            </a:prstGeom>
-            <a:noFill/>
-            <a:ln>
-              <a:noFill/>
-            </a:ln>
-          </p:spPr>
-        </p:pic>
-        <p:pic>
-          <p:nvPicPr>
-            <p:cNvPr id="404" name="Google Shape;404;p22"/>
-            <p:cNvPicPr preferRelativeResize="0"/>
-            <p:nvPr/>
-          </p:nvPicPr>
-          <p:blipFill rotWithShape="1">
-            <a:blip r:embed="rId3">
-              <a:alphaModFix amt="80000"/>
-            </a:blip>
-            <a:srcRect b="0" l="0" r="0" t="0"/>
-            <a:stretch/>
-          </p:blipFill>
-          <p:spPr>
-            <a:xfrm>
-              <a:off x="0" y="0"/>
-              <a:ext cx="2891870" cy="2689440"/>
-            </a:xfrm>
-            <a:prstGeom prst="rect">
-              <a:avLst/>
-            </a:prstGeom>
-            <a:noFill/>
-            <a:ln>
-              <a:noFill/>
-            </a:ln>
-          </p:spPr>
-        </p:pic>
-      </p:grpSp>
-      <p:grpSp>
-        <p:nvGrpSpPr>
-          <p:cNvPr id="405" name="Google Shape;405;p22"/>
-          <p:cNvGrpSpPr/>
-          <p:nvPr/>
-        </p:nvGrpSpPr>
-        <p:grpSpPr>
-          <a:xfrm rot="1153639">
-            <a:off x="979915" y="8814048"/>
-            <a:ext cx="3543137" cy="3367923"/>
-            <a:chOff x="0" y="0"/>
-            <a:chExt cx="4723947" cy="4490339"/>
-          </a:xfrm>
-        </p:grpSpPr>
-        <p:sp>
-          <p:nvSpPr>
-            <p:cNvPr id="406" name="Google Shape;406;p22"/>
-            <p:cNvSpPr/>
-            <p:nvPr/>
-          </p:nvSpPr>
-          <p:spPr>
-            <a:xfrm>
-              <a:off x="644072" y="410464"/>
-              <a:ext cx="4079875" cy="4079875"/>
-            </a:xfrm>
-            <a:custGeom>
-              <a:rect b="b" l="l" r="r" t="t"/>
-              <a:pathLst>
-                <a:path extrusionOk="0" h="6350000" w="6350000">
-                  <a:moveTo>
-                    <a:pt x="3175000" y="0"/>
-                  </a:moveTo>
-                  <a:cubicBezTo>
-                    <a:pt x="4928870" y="0"/>
-                    <a:pt x="6350000" y="1421130"/>
-                    <a:pt x="6350000" y="3175000"/>
-                  </a:cubicBezTo>
-                  <a:cubicBezTo>
-                    <a:pt x="6350000" y="4928870"/>
-                    <a:pt x="4928870" y="6350000"/>
-                    <a:pt x="3175000" y="6350000"/>
-                  </a:cubicBezTo>
-                  <a:cubicBezTo>
-                    <a:pt x="1421130" y="6350000"/>
-                    <a:pt x="0" y="4928870"/>
-                    <a:pt x="0" y="3175000"/>
-                  </a:cubicBezTo>
-                  <a:cubicBezTo>
-                    <a:pt x="0" y="1421130"/>
-                    <a:pt x="1421130" y="0"/>
-                    <a:pt x="3175000" y="0"/>
-                  </a:cubicBezTo>
-                  <a:close/>
-                </a:path>
-              </a:pathLst>
-            </a:custGeom>
-            <a:solidFill>
-              <a:srgbClr val="A100FF"/>
-            </a:solidFill>
-            <a:ln>
-              <a:noFill/>
-            </a:ln>
-          </p:spPr>
-          <p:txBody>
-            <a:bodyPr anchorCtr="0" anchor="ctr" bIns="91425" lIns="91425" spcFirstLastPara="1" rIns="91425" wrap="square" tIns="91425">
-              <a:noAutofit/>
-            </a:bodyPr>
-            <a:lstStyle/>
-            <a:p>
-              <a:pPr indent="0" lvl="0" marL="0" rtl="0" algn="l">
-                <a:spcBef>
-                  <a:spcPts val="0"/>
-                </a:spcBef>
-                <a:spcAft>
-                  <a:spcPts val="0"/>
-                </a:spcAft>
-                <a:buNone/>
-              </a:pPr>
-              <a:r>
-                <a:t/>
-              </a:r>
-              <a:endParaRPr/>
-            </a:p>
-          </p:txBody>
-        </p:sp>
-        <p:pic>
-          <p:nvPicPr>
-            <p:cNvPr id="407" name="Google Shape;407;p22"/>
-            <p:cNvPicPr preferRelativeResize="0"/>
-            <p:nvPr/>
-          </p:nvPicPr>
-          <p:blipFill rotWithShape="1">
-            <a:blip r:embed="rId4">
-              <a:alphaModFix/>
-            </a:blip>
-            <a:srcRect b="318" l="0" r="0" t="0"/>
-            <a:stretch/>
-          </p:blipFill>
-          <p:spPr>
-            <a:xfrm>
-              <a:off x="0" y="0"/>
-              <a:ext cx="4083273" cy="4091976"/>
-            </a:xfrm>
-            <a:prstGeom prst="rect">
-              <a:avLst/>
-            </a:prstGeom>
-            <a:noFill/>
-            <a:ln>
-              <a:noFill/>
-            </a:ln>
-          </p:spPr>
-        </p:pic>
-      </p:grpSp>
-      <p:grpSp>
-        <p:nvGrpSpPr>
-          <p:cNvPr id="408" name="Google Shape;408;p22"/>
-          <p:cNvGrpSpPr/>
-          <p:nvPr/>
-        </p:nvGrpSpPr>
-        <p:grpSpPr>
-          <a:xfrm>
-            <a:off x="655752" y="-1235382"/>
-            <a:ext cx="17253775" cy="2017080"/>
-            <a:chOff x="0" y="0"/>
-            <a:chExt cx="23005033" cy="2689440"/>
-          </a:xfrm>
-        </p:grpSpPr>
-        <p:pic>
-          <p:nvPicPr>
-            <p:cNvPr id="409" name="Google Shape;409;p22"/>
-            <p:cNvPicPr preferRelativeResize="0"/>
-            <p:nvPr/>
-          </p:nvPicPr>
-          <p:blipFill rotWithShape="1">
-            <a:blip r:embed="rId3">
-              <a:alphaModFix amt="80000"/>
-            </a:blip>
-            <a:srcRect b="0" l="0" r="0" t="0"/>
-            <a:stretch/>
-          </p:blipFill>
-          <p:spPr>
-            <a:xfrm>
-              <a:off x="16760969" y="0"/>
-              <a:ext cx="2891870" cy="2689440"/>
-            </a:xfrm>
-            <a:prstGeom prst="rect">
-              <a:avLst/>
-            </a:prstGeom>
-            <a:noFill/>
-            <a:ln>
-              <a:noFill/>
-            </a:ln>
-          </p:spPr>
-        </p:pic>
-        <p:pic>
-          <p:nvPicPr>
-            <p:cNvPr id="410" name="Google Shape;410;p22"/>
-            <p:cNvPicPr preferRelativeResize="0"/>
-            <p:nvPr/>
-          </p:nvPicPr>
-          <p:blipFill rotWithShape="1">
-            <a:blip r:embed="rId3">
-              <a:alphaModFix amt="80000"/>
-            </a:blip>
-            <a:srcRect b="0" l="0" r="0" t="0"/>
-            <a:stretch/>
-          </p:blipFill>
-          <p:spPr>
-            <a:xfrm>
-              <a:off x="13408776" y="0"/>
-              <a:ext cx="2891870" cy="2689440"/>
-            </a:xfrm>
-            <a:prstGeom prst="rect">
-              <a:avLst/>
-            </a:prstGeom>
-            <a:noFill/>
-            <a:ln>
-              <a:noFill/>
-            </a:ln>
-          </p:spPr>
-        </p:pic>
-        <p:pic>
-          <p:nvPicPr>
-            <p:cNvPr id="411" name="Google Shape;411;p22"/>
-            <p:cNvPicPr preferRelativeResize="0"/>
-            <p:nvPr/>
-          </p:nvPicPr>
-          <p:blipFill rotWithShape="1">
-            <a:blip r:embed="rId3">
-              <a:alphaModFix amt="80000"/>
-            </a:blip>
-            <a:srcRect b="0" l="0" r="0" t="0"/>
-            <a:stretch/>
-          </p:blipFill>
-          <p:spPr>
-            <a:xfrm>
-              <a:off x="10056582" y="0"/>
-              <a:ext cx="2891870" cy="2689440"/>
-            </a:xfrm>
-            <a:prstGeom prst="rect">
-              <a:avLst/>
-            </a:prstGeom>
-            <a:noFill/>
-            <a:ln>
-              <a:noFill/>
-            </a:ln>
-          </p:spPr>
-        </p:pic>
-        <p:pic>
-          <p:nvPicPr>
-            <p:cNvPr id="412" name="Google Shape;412;p22"/>
-            <p:cNvPicPr preferRelativeResize="0"/>
-            <p:nvPr/>
-          </p:nvPicPr>
-          <p:blipFill rotWithShape="1">
-            <a:blip r:embed="rId3">
-              <a:alphaModFix amt="80000"/>
-            </a:blip>
-            <a:srcRect b="0" l="0" r="0" t="0"/>
-            <a:stretch/>
-          </p:blipFill>
-          <p:spPr>
-            <a:xfrm>
-              <a:off x="20113163" y="0"/>
-              <a:ext cx="2891870" cy="2689440"/>
-            </a:xfrm>
-            <a:prstGeom prst="rect">
-              <a:avLst/>
-            </a:prstGeom>
-            <a:noFill/>
-            <a:ln>
-              <a:noFill/>
-            </a:ln>
-          </p:spPr>
-        </p:pic>
-        <p:pic>
-          <p:nvPicPr>
-            <p:cNvPr id="413" name="Google Shape;413;p22"/>
-            <p:cNvPicPr preferRelativeResize="0"/>
-            <p:nvPr/>
-          </p:nvPicPr>
-          <p:blipFill rotWithShape="1">
-            <a:blip r:embed="rId3">
-              <a:alphaModFix amt="80000"/>
-            </a:blip>
-            <a:srcRect b="0" l="0" r="0" t="0"/>
-            <a:stretch/>
-          </p:blipFill>
-          <p:spPr>
-            <a:xfrm>
-              <a:off x="6704388" y="0"/>
-              <a:ext cx="2891870" cy="2689440"/>
-            </a:xfrm>
-            <a:prstGeom prst="rect">
-              <a:avLst/>
-            </a:prstGeom>
-            <a:noFill/>
-            <a:ln>
-              <a:noFill/>
-            </a:ln>
-          </p:spPr>
-        </p:pic>
-        <p:pic>
-          <p:nvPicPr>
-            <p:cNvPr id="414" name="Google Shape;414;p22"/>
-            <p:cNvPicPr preferRelativeResize="0"/>
-            <p:nvPr/>
-          </p:nvPicPr>
-          <p:blipFill rotWithShape="1">
-            <a:blip r:embed="rId3">
-              <a:alphaModFix amt="80000"/>
-            </a:blip>
-            <a:srcRect b="0" l="0" r="0" t="0"/>
-            <a:stretch/>
-          </p:blipFill>
-          <p:spPr>
-            <a:xfrm>
-              <a:off x="3352194" y="0"/>
-              <a:ext cx="2891870" cy="2689440"/>
-            </a:xfrm>
-            <a:prstGeom prst="rect">
-              <a:avLst/>
-            </a:prstGeom>
-            <a:noFill/>
-            <a:ln>
-              <a:noFill/>
-            </a:ln>
-          </p:spPr>
-        </p:pic>
-        <p:pic>
-          <p:nvPicPr>
-            <p:cNvPr id="415" name="Google Shape;415;p22"/>
-            <p:cNvPicPr preferRelativeResize="0"/>
-            <p:nvPr/>
-          </p:nvPicPr>
-          <p:blipFill rotWithShape="1">
-            <a:blip r:embed="rId3">
-              <a:alphaModFix amt="80000"/>
-            </a:blip>
-            <a:srcRect b="0" l="0" r="0" t="0"/>
-            <a:stretch/>
-          </p:blipFill>
-          <p:spPr>
-            <a:xfrm>
-              <a:off x="0" y="0"/>
-              <a:ext cx="2891870" cy="2689440"/>
-            </a:xfrm>
-            <a:prstGeom prst="rect">
-              <a:avLst/>
-            </a:prstGeom>
-            <a:noFill/>
-            <a:ln>
-              <a:noFill/>
-            </a:ln>
-          </p:spPr>
-        </p:pic>
-      </p:grpSp>
-      <p:sp>
-        <p:nvSpPr>
-          <p:cNvPr id="416" name="Google Shape;416;p22"/>
-          <p:cNvSpPr/>
-          <p:nvPr/>
-        </p:nvSpPr>
-        <p:spPr>
-          <a:xfrm>
-            <a:off x="0" y="0"/>
-            <a:ext cx="2386500" cy="10287000"/>
-          </a:xfrm>
-          <a:prstGeom prst="rect">
-            <a:avLst/>
-          </a:prstGeom>
-          <a:solidFill>
-            <a:srgbClr val="A100FF"/>
-          </a:solidFill>
-          <a:ln>
-            <a:noFill/>
-          </a:ln>
-        </p:spPr>
-        <p:txBody>
-          <a:bodyPr anchorCtr="0" anchor="ctr" bIns="91425" lIns="91425" spcFirstLastPara="1" rIns="91425" wrap="square" tIns="91425">
-            <a:noAutofit/>
-          </a:bodyPr>
-          <a:lstStyle/>
-          <a:p>
-            <a:pPr indent="0" lvl="0" marL="0" rtl="0" algn="l">
-              <a:spcBef>
-                <a:spcPts val="0"/>
-              </a:spcBef>
-              <a:spcAft>
-                <a:spcPts val="0"/>
-              </a:spcAft>
-              <a:buNone/>
-            </a:pPr>
-            <a:r>
-              <a:t/>
-            </a:r>
-            <a:endParaRPr/>
-          </a:p>
-        </p:txBody>
-      </p:sp>
-      <p:grpSp>
-        <p:nvGrpSpPr>
-          <p:cNvPr id="417" name="Google Shape;417;p22"/>
-          <p:cNvGrpSpPr/>
-          <p:nvPr/>
-        </p:nvGrpSpPr>
-        <p:grpSpPr>
-          <a:xfrm>
-            <a:off x="16515246" y="-1685151"/>
-            <a:ext cx="3542960" cy="3367754"/>
-            <a:chOff x="0" y="0"/>
-            <a:chExt cx="4723947" cy="4490339"/>
-          </a:xfrm>
-        </p:grpSpPr>
-        <p:sp>
-          <p:nvSpPr>
-            <p:cNvPr id="418" name="Google Shape;418;p22"/>
-            <p:cNvSpPr/>
-            <p:nvPr/>
-          </p:nvSpPr>
-          <p:spPr>
-            <a:xfrm>
-              <a:off x="644072" y="410464"/>
-              <a:ext cx="4079875" cy="4079875"/>
-            </a:xfrm>
-            <a:custGeom>
-              <a:rect b="b" l="l" r="r" t="t"/>
-              <a:pathLst>
-                <a:path extrusionOk="0" h="6350000" w="6350000">
-                  <a:moveTo>
-                    <a:pt x="3175000" y="0"/>
-                  </a:moveTo>
-                  <a:cubicBezTo>
-                    <a:pt x="4928870" y="0"/>
-                    <a:pt x="6350000" y="1421130"/>
-                    <a:pt x="6350000" y="3175000"/>
-                  </a:cubicBezTo>
-                  <a:cubicBezTo>
-                    <a:pt x="6350000" y="4928870"/>
-                    <a:pt x="4928870" y="6350000"/>
-                    <a:pt x="3175000" y="6350000"/>
-                  </a:cubicBezTo>
-                  <a:cubicBezTo>
-                    <a:pt x="1421130" y="6350000"/>
-                    <a:pt x="0" y="4928870"/>
-                    <a:pt x="0" y="3175000"/>
-                  </a:cubicBezTo>
-                  <a:cubicBezTo>
-                    <a:pt x="0" y="1421130"/>
-                    <a:pt x="1421130" y="0"/>
-                    <a:pt x="3175000" y="0"/>
-                  </a:cubicBezTo>
-                  <a:close/>
-                </a:path>
-              </a:pathLst>
-            </a:custGeom>
-            <a:solidFill>
-              <a:srgbClr val="A100FF"/>
-            </a:solidFill>
-            <a:ln>
-              <a:noFill/>
-            </a:ln>
-          </p:spPr>
-          <p:txBody>
-            <a:bodyPr anchorCtr="0" anchor="ctr" bIns="91425" lIns="91425" spcFirstLastPara="1" rIns="91425" wrap="square" tIns="91425">
-              <a:noAutofit/>
-            </a:bodyPr>
-            <a:lstStyle/>
-            <a:p>
-              <a:pPr indent="0" lvl="0" marL="0" rtl="0" algn="l">
-                <a:spcBef>
-                  <a:spcPts val="0"/>
-                </a:spcBef>
-                <a:spcAft>
-                  <a:spcPts val="0"/>
-                </a:spcAft>
-                <a:buNone/>
-              </a:pPr>
-              <a:r>
-                <a:t/>
-              </a:r>
-              <a:endParaRPr/>
-            </a:p>
-          </p:txBody>
-        </p:sp>
-        <p:pic>
-          <p:nvPicPr>
-            <p:cNvPr id="419" name="Google Shape;419;p22"/>
-            <p:cNvPicPr preferRelativeResize="0"/>
-            <p:nvPr/>
-          </p:nvPicPr>
-          <p:blipFill rotWithShape="1">
-            <a:blip r:embed="rId4">
-              <a:alphaModFix/>
-            </a:blip>
-            <a:srcRect b="318" l="0" r="0" t="0"/>
-            <a:stretch/>
-          </p:blipFill>
-          <p:spPr>
-            <a:xfrm>
-              <a:off x="0" y="0"/>
-              <a:ext cx="4083273" cy="4091976"/>
-            </a:xfrm>
-            <a:prstGeom prst="rect">
-              <a:avLst/>
-            </a:prstGeom>
-            <a:noFill/>
-            <a:ln>
-              <a:noFill/>
-            </a:ln>
-          </p:spPr>
-        </p:pic>
-      </p:grpSp>
-      <p:pic>
-        <p:nvPicPr>
-          <p:cNvPr id="420" name="Google Shape;420;p22" title="Chart"/>
-          <p:cNvPicPr preferRelativeResize="0"/>
-          <p:nvPr/>
-        </p:nvPicPr>
-        <p:blipFill>
-          <a:blip r:embed="rId5">
-            <a:alphaModFix/>
-          </a:blip>
-          <a:stretch>
-            <a:fillRect/>
-          </a:stretch>
-        </p:blipFill>
-        <p:spPr>
-          <a:xfrm>
-            <a:off x="2941107" y="2961075"/>
-            <a:ext cx="7176912" cy="4437726"/>
-          </a:xfrm>
-          <a:prstGeom prst="rect">
-            <a:avLst/>
-          </a:prstGeom>
-          <a:noFill/>
-          <a:ln>
-            <a:noFill/>
-          </a:ln>
-        </p:spPr>
-      </p:pic>
-      <p:pic>
-        <p:nvPicPr>
-          <p:cNvPr id="421" name="Google Shape;421;p22" title="Chart"/>
-          <p:cNvPicPr preferRelativeResize="0"/>
-          <p:nvPr/>
-        </p:nvPicPr>
-        <p:blipFill>
-          <a:blip r:embed="rId6">
-            <a:alphaModFix/>
-          </a:blip>
-          <a:stretch>
-            <a:fillRect/>
-          </a:stretch>
-        </p:blipFill>
-        <p:spPr>
-          <a:xfrm>
-            <a:off x="10656399" y="2961078"/>
-            <a:ext cx="7176927" cy="4437733"/>
-          </a:xfrm>
-          <a:prstGeom prst="rect">
-            <a:avLst/>
-          </a:prstGeom>
-          <a:noFill/>
-          <a:ln>
-            <a:noFill/>
-          </a:ln>
-        </p:spPr>
-      </p:pic>
-      <p:sp>
-        <p:nvSpPr>
-          <p:cNvPr id="422" name="Google Shape;422;p22"/>
-          <p:cNvSpPr txBox="1"/>
-          <p:nvPr/>
-        </p:nvSpPr>
-        <p:spPr>
-          <a:xfrm>
-            <a:off x="3049475" y="1103863"/>
-            <a:ext cx="8950500" cy="1416000"/>
-          </a:xfrm>
-          <a:prstGeom prst="rect">
-            <a:avLst/>
-          </a:prstGeom>
-          <a:noFill/>
-          <a:ln>
-            <a:noFill/>
-          </a:ln>
-        </p:spPr>
-        <p:txBody>
-          <a:bodyPr anchorCtr="0" anchor="t" bIns="91425" lIns="91425" spcFirstLastPara="1" rIns="91425" wrap="square" tIns="91425">
-            <a:spAutoFit/>
-          </a:bodyPr>
-          <a:lstStyle/>
-          <a:p>
-            <a:pPr indent="0" lvl="0" marL="0" rtl="0" algn="l">
-              <a:spcBef>
-                <a:spcPts val="0"/>
-              </a:spcBef>
-              <a:spcAft>
-                <a:spcPts val="0"/>
-              </a:spcAft>
-              <a:buNone/>
-            </a:pPr>
-            <a:r>
-              <a:rPr lang="cs-CZ" sz="8000">
-                <a:solidFill>
-                  <a:schemeClr val="dk1"/>
-                </a:solidFill>
-              </a:rPr>
-              <a:t>Date Insight</a:t>
-            </a:r>
-            <a:endParaRPr sz="8000">
-              <a:solidFill>
-                <a:schemeClr val="dk1"/>
-              </a:solidFill>
-            </a:endParaRPr>
-          </a:p>
-        </p:txBody>
-      </p:sp>
-      <p:sp>
-        <p:nvSpPr>
-          <p:cNvPr id="423" name="Google Shape;423;p22"/>
-          <p:cNvSpPr txBox="1"/>
-          <p:nvPr/>
-        </p:nvSpPr>
-        <p:spPr>
-          <a:xfrm>
-            <a:off x="2941100" y="7754100"/>
-            <a:ext cx="7176900" cy="985200"/>
-          </a:xfrm>
-          <a:prstGeom prst="rect">
-            <a:avLst/>
-          </a:prstGeom>
-          <a:noFill/>
-          <a:ln>
-            <a:noFill/>
-          </a:ln>
-        </p:spPr>
-        <p:txBody>
-          <a:bodyPr anchorCtr="0" anchor="t" bIns="91425" lIns="91425" spcFirstLastPara="1" rIns="91425" wrap="square" tIns="91425">
-            <a:spAutoFit/>
-          </a:bodyPr>
-          <a:lstStyle/>
-          <a:p>
-            <a:pPr indent="0" lvl="0" marL="0" rtl="0" algn="l">
-              <a:spcBef>
-                <a:spcPts val="0"/>
-              </a:spcBef>
-              <a:spcAft>
-                <a:spcPts val="0"/>
-              </a:spcAft>
-              <a:buNone/>
-            </a:pPr>
-            <a:r>
-              <a:rPr lang="cs-CZ" sz="2600">
-                <a:solidFill>
-                  <a:schemeClr val="dk1"/>
-                </a:solidFill>
-              </a:rPr>
-              <a:t>May has the highest popularity of 64,534 which is followed by October, August, and November</a:t>
-            </a:r>
-            <a:endParaRPr sz="2600">
-              <a:solidFill>
-                <a:schemeClr val="dk1"/>
-              </a:solidFill>
-            </a:endParaRPr>
-          </a:p>
-        </p:txBody>
-      </p:sp>
-      <p:sp>
-        <p:nvSpPr>
-          <p:cNvPr id="424" name="Google Shape;424;p22"/>
-          <p:cNvSpPr txBox="1"/>
-          <p:nvPr/>
-        </p:nvSpPr>
-        <p:spPr>
-          <a:xfrm>
-            <a:off x="10656413" y="7754100"/>
-            <a:ext cx="7176900" cy="1785600"/>
-          </a:xfrm>
-          <a:prstGeom prst="rect">
-            <a:avLst/>
-          </a:prstGeom>
-          <a:noFill/>
-          <a:ln>
-            <a:noFill/>
-          </a:ln>
-        </p:spPr>
-        <p:txBody>
-          <a:bodyPr anchorCtr="0" anchor="t" bIns="91425" lIns="91425" spcFirstLastPara="1" rIns="91425" wrap="square" tIns="91425">
-            <a:spAutoFit/>
-          </a:bodyPr>
-          <a:lstStyle/>
-          <a:p>
-            <a:pPr indent="0" lvl="0" marL="0" rtl="0" algn="l">
-              <a:spcBef>
-                <a:spcPts val="0"/>
-              </a:spcBef>
-              <a:spcAft>
-                <a:spcPts val="0"/>
-              </a:spcAft>
-              <a:buNone/>
-            </a:pPr>
-            <a:r>
-              <a:rPr lang="cs-CZ" sz="2600">
-                <a:solidFill>
-                  <a:schemeClr val="dk1"/>
-                </a:solidFill>
-              </a:rPr>
-              <a:t>Despite May having the highest popularity score, it does not have the most posts which is tied at 622 between October, August, and November</a:t>
-            </a:r>
-            <a:endParaRPr sz="2600">
-              <a:solidFill>
-                <a:schemeClr val="dk1"/>
-              </a:solidFill>
-            </a:endParaRPr>
-          </a:p>
-        </p:txBody>
-      </p:sp>
-    </p:spTree>
-  </p:cSld>
-  <p:clrMapOvr>
-    <a:masterClrMapping/>
-  </p:clrMapOvr>
-</p:sld>
-</file>
-
-<file path=ppt/slides/slide11.xml><?xml version="1.0" encoding="utf-8"?>
-<p:sld xmlns:a="http://schemas.openxmlformats.org/drawingml/2006/main" xmlns:r="http://schemas.openxmlformats.org/officeDocument/2006/relationships" xmlns:mc="http://schemas.openxmlformats.org/markup-compatibility/2006" xmlns:mv="urn:schemas-microsoft-com:mac:vml" xmlns:p="http://schemas.openxmlformats.org/presentationml/2006/main" xmlns:c="http://schemas.openxmlformats.org/drawingml/2006/chart" xmlns:dgm="http://schemas.openxmlformats.org/drawingml/2006/diagram" xmlns:o="urn:schemas-microsoft-com:office:office" xmlns:v="urn:schemas-microsoft-com:vml" xmlns:pvml="urn:schemas-microsoft-com:office:powerpoint" xmlns:com="http://schemas.openxmlformats.org/drawingml/2006/compatibility" xmlns:p14="http://schemas.microsoft.com/office/powerpoint/2010/main" xmlns:p15="http://schemas.microsoft.com/office/powerpoint/2012/main" xmlns:ahyp="http://schemas.microsoft.com/office/drawing/2018/hyperlinkcolor">
-  <p:cSld>
-    <p:spTree>
-      <p:nvGrpSpPr>
-        <p:cNvPr id="432" name="Shape 432"/>
+        <p:cNvPr id="394" name="Shape 394"/>
         <p:cNvGrpSpPr/>
         <p:nvPr/>
       </p:nvGrpSpPr>
@@ -16674,7 +15515,7 @@
       </p:grpSpPr>
       <p:pic>
         <p:nvPicPr>
-          <p:cNvPr id="433" name="Google Shape;433;p23"/>
+          <p:cNvPr id="395" name="Google Shape;395;p22"/>
           <p:cNvPicPr preferRelativeResize="0"/>
           <p:nvPr/>
         </p:nvPicPr>
@@ -16701,7 +15542,7 @@
       </p:pic>
       <p:pic>
         <p:nvPicPr>
-          <p:cNvPr id="434" name="Google Shape;434;p23"/>
+          <p:cNvPr id="396" name="Google Shape;396;p22"/>
           <p:cNvPicPr preferRelativeResize="0"/>
           <p:nvPr/>
         </p:nvPicPr>
@@ -16728,7 +15569,7 @@
       </p:pic>
       <p:pic>
         <p:nvPicPr>
-          <p:cNvPr id="435" name="Google Shape;435;p23"/>
+          <p:cNvPr id="397" name="Google Shape;397;p22"/>
           <p:cNvPicPr preferRelativeResize="0"/>
           <p:nvPr/>
         </p:nvPicPr>
@@ -16755,7 +15596,7 @@
       </p:pic>
       <p:pic>
         <p:nvPicPr>
-          <p:cNvPr id="436" name="Google Shape;436;p23"/>
+          <p:cNvPr id="398" name="Google Shape;398;p22"/>
           <p:cNvPicPr preferRelativeResize="0"/>
           <p:nvPr/>
         </p:nvPicPr>
@@ -16782,7 +15623,7 @@
       </p:pic>
       <p:sp>
         <p:nvSpPr>
-          <p:cNvPr id="437" name="Google Shape;437;p23"/>
+          <p:cNvPr id="399" name="Google Shape;399;p22"/>
           <p:cNvSpPr txBox="1"/>
           <p:nvPr/>
         </p:nvSpPr>
@@ -16835,7 +15676,7 @@
       </p:sp>
       <p:grpSp>
         <p:nvGrpSpPr>
-          <p:cNvPr id="438" name="Google Shape;438;p23"/>
+          <p:cNvPr id="400" name="Google Shape;400;p22"/>
           <p:cNvGrpSpPr/>
           <p:nvPr/>
         </p:nvGrpSpPr>
@@ -16849,7 +15690,7 @@
         </p:grpSpPr>
         <p:pic>
           <p:nvPicPr>
-            <p:cNvPr id="439" name="Google Shape;439;p23"/>
+            <p:cNvPr id="401" name="Google Shape;401;p22"/>
             <p:cNvPicPr preferRelativeResize="0"/>
             <p:nvPr/>
           </p:nvPicPr>
@@ -16876,7 +15717,7 @@
         </p:pic>
         <p:pic>
           <p:nvPicPr>
-            <p:cNvPr id="440" name="Google Shape;440;p23"/>
+            <p:cNvPr id="402" name="Google Shape;402;p22"/>
             <p:cNvPicPr preferRelativeResize="0"/>
             <p:nvPr/>
           </p:nvPicPr>
@@ -16903,7 +15744,7 @@
         </p:pic>
         <p:pic>
           <p:nvPicPr>
-            <p:cNvPr id="441" name="Google Shape;441;p23"/>
+            <p:cNvPr id="403" name="Google Shape;403;p22"/>
             <p:cNvPicPr preferRelativeResize="0"/>
             <p:nvPr/>
           </p:nvPicPr>
@@ -16930,7 +15771,7 @@
         </p:pic>
         <p:pic>
           <p:nvPicPr>
-            <p:cNvPr id="442" name="Google Shape;442;p23"/>
+            <p:cNvPr id="404" name="Google Shape;404;p22"/>
             <p:cNvPicPr preferRelativeResize="0"/>
             <p:nvPr/>
           </p:nvPicPr>
@@ -16958,7 +15799,7 @@
       </p:grpSp>
       <p:grpSp>
         <p:nvGrpSpPr>
-          <p:cNvPr id="443" name="Google Shape;443;p23"/>
+          <p:cNvPr id="405" name="Google Shape;405;p22"/>
           <p:cNvGrpSpPr/>
           <p:nvPr/>
         </p:nvGrpSpPr>
@@ -16972,7 +15813,7 @@
         </p:grpSpPr>
         <p:pic>
           <p:nvPicPr>
-            <p:cNvPr id="444" name="Google Shape;444;p23"/>
+            <p:cNvPr id="406" name="Google Shape;406;p22"/>
             <p:cNvPicPr preferRelativeResize="0"/>
             <p:nvPr/>
           </p:nvPicPr>
@@ -16999,7 +15840,7 @@
         </p:pic>
         <p:pic>
           <p:nvPicPr>
-            <p:cNvPr id="445" name="Google Shape;445;p23"/>
+            <p:cNvPr id="407" name="Google Shape;407;p22"/>
             <p:cNvPicPr preferRelativeResize="0"/>
             <p:nvPr/>
           </p:nvPicPr>
@@ -17026,7 +15867,7 @@
         </p:pic>
         <p:pic>
           <p:nvPicPr>
-            <p:cNvPr id="446" name="Google Shape;446;p23"/>
+            <p:cNvPr id="408" name="Google Shape;408;p22"/>
             <p:cNvPicPr preferRelativeResize="0"/>
             <p:nvPr/>
           </p:nvPicPr>
@@ -17053,7 +15894,7 @@
         </p:pic>
         <p:pic>
           <p:nvPicPr>
-            <p:cNvPr id="447" name="Google Shape;447;p23"/>
+            <p:cNvPr id="409" name="Google Shape;409;p22"/>
             <p:cNvPicPr preferRelativeResize="0"/>
             <p:nvPr/>
           </p:nvPicPr>
@@ -17081,7 +15922,7 @@
       </p:grpSp>
       <p:grpSp>
         <p:nvGrpSpPr>
-          <p:cNvPr id="448" name="Google Shape;448;p23"/>
+          <p:cNvPr id="410" name="Google Shape;410;p22"/>
           <p:cNvGrpSpPr/>
           <p:nvPr/>
         </p:nvGrpSpPr>
@@ -17095,7 +15936,7 @@
         </p:grpSpPr>
         <p:sp>
           <p:nvSpPr>
-            <p:cNvPr id="449" name="Google Shape;449;p23"/>
+            <p:cNvPr id="411" name="Google Shape;411;p22"/>
             <p:cNvSpPr txBox="1"/>
             <p:nvPr/>
           </p:nvSpPr>
@@ -17147,7 +15988,7 @@
         </p:sp>
         <p:sp>
           <p:nvSpPr>
-            <p:cNvPr id="450" name="Google Shape;450;p23"/>
+            <p:cNvPr id="412" name="Google Shape;412;p22"/>
             <p:cNvSpPr txBox="1"/>
             <p:nvPr/>
           </p:nvSpPr>
@@ -17200,7 +16041,7 @@
       </p:grpSp>
       <p:grpSp>
         <p:nvGrpSpPr>
-          <p:cNvPr id="451" name="Google Shape;451;p23"/>
+          <p:cNvPr id="413" name="Google Shape;413;p22"/>
           <p:cNvGrpSpPr/>
           <p:nvPr/>
         </p:nvGrpSpPr>
@@ -17214,7 +16055,7 @@
         </p:grpSpPr>
         <p:sp>
           <p:nvSpPr>
-            <p:cNvPr id="452" name="Google Shape;452;p23"/>
+            <p:cNvPr id="414" name="Google Shape;414;p22"/>
             <p:cNvSpPr txBox="1"/>
             <p:nvPr/>
           </p:nvSpPr>
@@ -17266,7 +16107,7 @@
         </p:sp>
         <p:sp>
           <p:nvSpPr>
-            <p:cNvPr id="453" name="Google Shape;453;p23"/>
+            <p:cNvPr id="415" name="Google Shape;415;p22"/>
             <p:cNvSpPr txBox="1"/>
             <p:nvPr/>
           </p:nvSpPr>
@@ -17319,14 +16160,14 @@
       </p:grpSp>
       <p:sp>
         <p:nvSpPr>
-          <p:cNvPr id="454" name="Google Shape;454;p23"/>
+          <p:cNvPr id="416" name="Google Shape;416;p22"/>
           <p:cNvSpPr txBox="1"/>
           <p:nvPr/>
         </p:nvSpPr>
         <p:spPr>
           <a:xfrm>
-            <a:off x="11581825" y="1634100"/>
-            <a:ext cx="6029100" cy="7018800"/>
+            <a:off x="11581825" y="1610400"/>
+            <a:ext cx="6029100" cy="7089600"/>
           </a:xfrm>
           <a:prstGeom prst="rect">
             <a:avLst/>
@@ -17342,9 +16183,9 @@
           </a:bodyPr>
           <a:lstStyle/>
           <a:p>
-            <a:pPr indent="-419100" lvl="0" marL="457200" rtl="0" algn="l">
+            <a:pPr indent="0" lvl="0" marL="0" rtl="0" algn="l">
               <a:lnSpc>
-                <a:spcPct val="115000"/>
+                <a:spcPct val="150000"/>
               </a:lnSpc>
               <a:spcBef>
                 <a:spcPts val="0"/>
@@ -17352,11 +16193,7 @@
               <a:spcAft>
                 <a:spcPts val="0"/>
               </a:spcAft>
-              <a:buClr>
-                <a:schemeClr val="dk1"/>
-              </a:buClr>
-              <a:buSzPts val="3000"/>
-              <a:buAutoNum type="arabicPeriod"/>
+              <a:buNone/>
             </a:pPr>
             <a:r>
               <a:rPr lang="cs-CZ" sz="3000">
@@ -17364,7 +16201,7 @@
                   <a:schemeClr val="dk1"/>
                 </a:solidFill>
               </a:rPr>
-              <a:t>Top 5 popular categories (travel, science, healthy eating, animals, cooking) appear to have their positions secured and perform similar in reaction type</a:t>
+              <a:t>Analysis</a:t>
             </a:r>
             <a:endParaRPr sz="3000">
               <a:solidFill>
@@ -17373,7 +16210,7 @@
             </a:endParaRPr>
           </a:p>
           <a:p>
-            <a:pPr indent="-419100" lvl="0" marL="457200" rtl="0" algn="l">
+            <a:pPr indent="0" lvl="0" marL="0" rtl="0" algn="l">
               <a:lnSpc>
                 <a:spcPct val="115000"/>
               </a:lnSpc>
@@ -17383,11 +16220,56 @@
               <a:spcAft>
                 <a:spcPts val="0"/>
               </a:spcAft>
-              <a:buClr>
+              <a:buNone/>
+            </a:pPr>
+            <a:r>
+              <a:rPr lang="cs-CZ" sz="2200">
+                <a:solidFill>
+                  <a:schemeClr val="dk1"/>
+                </a:solidFill>
+              </a:rPr>
+              <a:t>Travel is the most popular category and is 2nd in photos and videos. This implies people want to enjoy the feel of experiencing new location or exploring.</a:t>
+            </a:r>
+            <a:endParaRPr sz="2200">
+              <a:solidFill>
                 <a:schemeClr val="dk1"/>
-              </a:buClr>
-              <a:buSzPts val="3000"/>
-              <a:buAutoNum type="arabicPeriod"/>
+              </a:solidFill>
+            </a:endParaRPr>
+          </a:p>
+          <a:p>
+            <a:pPr indent="0" lvl="0" marL="0" rtl="0" algn="l">
+              <a:lnSpc>
+                <a:spcPct val="150000"/>
+              </a:lnSpc>
+              <a:spcBef>
+                <a:spcPts val="0"/>
+              </a:spcBef>
+              <a:spcAft>
+                <a:spcPts val="0"/>
+              </a:spcAft>
+              <a:buNone/>
+            </a:pPr>
+            <a:r>
+              <a:t/>
+            </a:r>
+            <a:endParaRPr sz="2200">
+              <a:solidFill>
+                <a:schemeClr val="dk1"/>
+              </a:solidFill>
+            </a:endParaRPr>
+          </a:p>
+          <a:p>
+            <a:pPr indent="0" lvl="0" marL="0" rtl="0" algn="l">
+              <a:lnSpc>
+                <a:spcPct val="150000"/>
+              </a:lnSpc>
+              <a:spcBef>
+                <a:spcPts val="0"/>
+              </a:spcBef>
+              <a:spcAft>
+                <a:spcPts val="0"/>
+              </a:spcAft>
+              <a:buNone/>
             </a:pPr>
             <a:r>
               <a:rPr lang="cs-CZ" sz="3000">
@@ -17395,23 +16277,7 @@
                   <a:schemeClr val="dk1"/>
                 </a:solidFill>
               </a:rPr>
-              <a:t>Content Type has a clear </a:t>
-            </a:r>
-            <a:r>
-              <a:rPr lang="cs-CZ" sz="3000">
-                <a:solidFill>
-                  <a:schemeClr val="dk1"/>
-                </a:solidFill>
-              </a:rPr>
-              <a:t>positive</a:t>
-            </a:r>
-            <a:r>
-              <a:rPr lang="cs-CZ" sz="3000">
-                <a:solidFill>
-                  <a:schemeClr val="dk1"/>
-                </a:solidFill>
-              </a:rPr>
-              <a:t> correlation between popularity and number of posts</a:t>
+              <a:t>Insights</a:t>
             </a:r>
             <a:endParaRPr sz="3000">
               <a:solidFill>
@@ -17420,7 +16286,7 @@
             </a:endParaRPr>
           </a:p>
           <a:p>
-            <a:pPr indent="-419100" lvl="0" marL="457200" rtl="0" algn="l">
+            <a:pPr indent="0" lvl="0" marL="0" rtl="0" algn="l">
               <a:lnSpc>
                 <a:spcPct val="115000"/>
               </a:lnSpc>
@@ -17430,21 +16296,33 @@
               <a:spcAft>
                 <a:spcPts val="0"/>
               </a:spcAft>
-              <a:buClr>
-                <a:schemeClr val="dk1"/>
-              </a:buClr>
-              <a:buSzPts val="3000"/>
-              <a:buAutoNum type="arabicPeriod"/>
+              <a:buNone/>
             </a:pPr>
             <a:r>
-              <a:rPr lang="cs-CZ" sz="3000">
+              <a:rPr lang="cs-CZ" sz="2200">
                 <a:solidFill>
                   <a:schemeClr val="dk1"/>
                 </a:solidFill>
               </a:rPr>
-              <a:t>The amount of posts sent in a month does not appear to directly affect the popularity score</a:t>
+              <a:t>With travel being the top category, it might be </a:t>
             </a:r>
-            <a:endParaRPr sz="3000">
+            <a:r>
+              <a:rPr lang="cs-CZ" sz="2200">
+                <a:solidFill>
+                  <a:schemeClr val="dk1"/>
+                </a:solidFill>
+              </a:rPr>
+              <a:t>beneficial</a:t>
+            </a:r>
+            <a:r>
+              <a:rPr lang="cs-CZ" sz="2200">
+                <a:solidFill>
+                  <a:schemeClr val="dk1"/>
+                </a:solidFill>
+              </a:rPr>
+              <a:t> to look into working with traveling agencies. It is also worth noting since cooking and healthy eating are quite similar, it is a good idea to market towards that audience through audio or gifs with recipes or products. Finally, for more user engagement in the animal category, a push towards audio and photos can help to boost that.</a:t>
+            </a:r>
+            <a:endParaRPr sz="2200">
               <a:solidFill>
                 <a:schemeClr val="dk1"/>
               </a:solidFill>
@@ -17460,7 +16338,7 @@
 </p:sld>
 </file>
 
-<file path=ppt/slides/slide12.xml><?xml version="1.0" encoding="utf-8"?>
+<file path=ppt/slides/slide11.xml><?xml version="1.0" encoding="utf-8"?>
 <p:sld xmlns:a="http://schemas.openxmlformats.org/drawingml/2006/main" xmlns:r="http://schemas.openxmlformats.org/officeDocument/2006/relationships" xmlns:mc="http://schemas.openxmlformats.org/markup-compatibility/2006" xmlns:mv="urn:schemas-microsoft-com:mac:vml" xmlns:p="http://schemas.openxmlformats.org/presentationml/2006/main" xmlns:c="http://schemas.openxmlformats.org/drawingml/2006/chart" xmlns:dgm="http://schemas.openxmlformats.org/drawingml/2006/diagram" xmlns:o="urn:schemas-microsoft-com:office:office" xmlns:v="urn:schemas-microsoft-com:vml" xmlns:pvml="urn:schemas-microsoft-com:office:powerpoint" xmlns:com="http://schemas.openxmlformats.org/drawingml/2006/compatibility" xmlns:p14="http://schemas.microsoft.com/office/powerpoint/2010/main" xmlns:p15="http://schemas.microsoft.com/office/powerpoint/2012/main" xmlns:ahyp="http://schemas.microsoft.com/office/drawing/2018/hyperlinkcolor">
   <p:cSld>
     <p:bg>
@@ -17472,7 +16350,7 @@
     </p:bg>
     <p:spTree>
       <p:nvGrpSpPr>
-        <p:cNvPr id="462" name="Shape 462"/>
+        <p:cNvPr id="424" name="Shape 424"/>
         <p:cNvGrpSpPr/>
         <p:nvPr/>
       </p:nvGrpSpPr>
@@ -17486,7 +16364,7 @@
       </p:grpSpPr>
       <p:sp>
         <p:nvSpPr>
-          <p:cNvPr id="463" name="Google Shape;463;p24"/>
+          <p:cNvPr id="425" name="Google Shape;425;p23"/>
           <p:cNvSpPr txBox="1"/>
           <p:nvPr/>
         </p:nvSpPr>
@@ -17539,7 +16417,7 @@
       </p:sp>
       <p:grpSp>
         <p:nvGrpSpPr>
-          <p:cNvPr id="464" name="Google Shape;464;p24"/>
+          <p:cNvPr id="426" name="Google Shape;426;p23"/>
           <p:cNvGrpSpPr/>
           <p:nvPr/>
         </p:nvGrpSpPr>
@@ -17553,7 +16431,7 @@
         </p:grpSpPr>
         <p:sp>
           <p:nvSpPr>
-            <p:cNvPr id="465" name="Google Shape;465;p24"/>
+            <p:cNvPr id="427" name="Google Shape;427;p23"/>
             <p:cNvSpPr/>
             <p:nvPr/>
           </p:nvSpPr>
@@ -17624,7 +16502,7 @@
         </p:sp>
         <p:pic>
           <p:nvPicPr>
-            <p:cNvPr id="466" name="Google Shape;466;p24"/>
+            <p:cNvPr id="428" name="Google Shape;428;p23"/>
             <p:cNvPicPr preferRelativeResize="0"/>
             <p:nvPr/>
           </p:nvPicPr>
@@ -17652,7 +16530,7 @@
       </p:grpSp>
       <p:sp>
         <p:nvSpPr>
-          <p:cNvPr id="467" name="Google Shape;467;p24"/>
+          <p:cNvPr id="429" name="Google Shape;429;p23"/>
           <p:cNvSpPr txBox="1"/>
           <p:nvPr/>
         </p:nvSpPr>
@@ -17705,7 +16583,7 @@
       </p:sp>
       <p:grpSp>
         <p:nvGrpSpPr>
-          <p:cNvPr id="468" name="Google Shape;468;p24"/>
+          <p:cNvPr id="430" name="Google Shape;430;p23"/>
           <p:cNvGrpSpPr/>
           <p:nvPr/>
         </p:nvGrpSpPr>
@@ -17719,7 +16597,7 @@
         </p:grpSpPr>
         <p:pic>
           <p:nvPicPr>
-            <p:cNvPr id="469" name="Google Shape;469;p24"/>
+            <p:cNvPr id="431" name="Google Shape;431;p23"/>
             <p:cNvPicPr preferRelativeResize="0"/>
             <p:nvPr/>
           </p:nvPicPr>
@@ -17746,7 +16624,7 @@
         </p:pic>
         <p:pic>
           <p:nvPicPr>
-            <p:cNvPr id="470" name="Google Shape;470;p24"/>
+            <p:cNvPr id="432" name="Google Shape;432;p23"/>
             <p:cNvPicPr preferRelativeResize="0"/>
             <p:nvPr/>
           </p:nvPicPr>
@@ -17773,7 +16651,7 @@
         </p:pic>
         <p:pic>
           <p:nvPicPr>
-            <p:cNvPr id="471" name="Google Shape;471;p24"/>
+            <p:cNvPr id="433" name="Google Shape;433;p23"/>
             <p:cNvPicPr preferRelativeResize="0"/>
             <p:nvPr/>
           </p:nvPicPr>
@@ -17800,7 +16678,7 @@
         </p:pic>
         <p:pic>
           <p:nvPicPr>
-            <p:cNvPr id="472" name="Google Shape;472;p24"/>
+            <p:cNvPr id="434" name="Google Shape;434;p23"/>
             <p:cNvPicPr preferRelativeResize="0"/>
             <p:nvPr/>
           </p:nvPicPr>
@@ -17827,7 +16705,7 @@
         </p:pic>
         <p:pic>
           <p:nvPicPr>
-            <p:cNvPr id="473" name="Google Shape;473;p24"/>
+            <p:cNvPr id="435" name="Google Shape;435;p23"/>
             <p:cNvPicPr preferRelativeResize="0"/>
             <p:nvPr/>
           </p:nvPicPr>
@@ -17854,7 +16732,7 @@
         </p:pic>
         <p:pic>
           <p:nvPicPr>
-            <p:cNvPr id="474" name="Google Shape;474;p24"/>
+            <p:cNvPr id="436" name="Google Shape;436;p23"/>
             <p:cNvPicPr preferRelativeResize="0"/>
             <p:nvPr/>
           </p:nvPicPr>
@@ -17881,7 +16759,7 @@
         </p:pic>
         <p:pic>
           <p:nvPicPr>
-            <p:cNvPr id="475" name="Google Shape;475;p24"/>
+            <p:cNvPr id="437" name="Google Shape;437;p23"/>
             <p:cNvPicPr preferRelativeResize="0"/>
             <p:nvPr/>
           </p:nvPicPr>
@@ -17909,7 +16787,7 @@
       </p:grpSp>
       <p:grpSp>
         <p:nvGrpSpPr>
-          <p:cNvPr id="476" name="Google Shape;476;p24"/>
+          <p:cNvPr id="438" name="Google Shape;438;p23"/>
           <p:cNvGrpSpPr/>
           <p:nvPr/>
         </p:nvGrpSpPr>
@@ -17923,7 +16801,7 @@
         </p:grpSpPr>
         <p:pic>
           <p:nvPicPr>
-            <p:cNvPr id="477" name="Google Shape;477;p24"/>
+            <p:cNvPr id="439" name="Google Shape;439;p23"/>
             <p:cNvPicPr preferRelativeResize="0"/>
             <p:nvPr/>
           </p:nvPicPr>
@@ -17950,7 +16828,7 @@
         </p:pic>
         <p:pic>
           <p:nvPicPr>
-            <p:cNvPr id="478" name="Google Shape;478;p24"/>
+            <p:cNvPr id="440" name="Google Shape;440;p23"/>
             <p:cNvPicPr preferRelativeResize="0"/>
             <p:nvPr/>
           </p:nvPicPr>
@@ -17977,7 +16855,7 @@
         </p:pic>
         <p:pic>
           <p:nvPicPr>
-            <p:cNvPr id="479" name="Google Shape;479;p24"/>
+            <p:cNvPr id="441" name="Google Shape;441;p23"/>
             <p:cNvPicPr preferRelativeResize="0"/>
             <p:nvPr/>
           </p:nvPicPr>
@@ -18004,7 +16882,7 @@
         </p:pic>
         <p:pic>
           <p:nvPicPr>
-            <p:cNvPr id="480" name="Google Shape;480;p24"/>
+            <p:cNvPr id="442" name="Google Shape;442;p23"/>
             <p:cNvPicPr preferRelativeResize="0"/>
             <p:nvPr/>
           </p:nvPicPr>
@@ -18031,7 +16909,7 @@
         </p:pic>
         <p:pic>
           <p:nvPicPr>
-            <p:cNvPr id="481" name="Google Shape;481;p24"/>
+            <p:cNvPr id="443" name="Google Shape;443;p23"/>
             <p:cNvPicPr preferRelativeResize="0"/>
             <p:nvPr/>
           </p:nvPicPr>
@@ -18058,7 +16936,7 @@
         </p:pic>
         <p:pic>
           <p:nvPicPr>
-            <p:cNvPr id="482" name="Google Shape;482;p24"/>
+            <p:cNvPr id="444" name="Google Shape;444;p23"/>
             <p:cNvPicPr preferRelativeResize="0"/>
             <p:nvPr/>
           </p:nvPicPr>
@@ -18085,7 +16963,7 @@
         </p:pic>
         <p:pic>
           <p:nvPicPr>
-            <p:cNvPr id="483" name="Google Shape;483;p24"/>
+            <p:cNvPr id="445" name="Google Shape;445;p23"/>
             <p:cNvPicPr preferRelativeResize="0"/>
             <p:nvPr/>
           </p:nvPicPr>
@@ -19805,8 +18683,8 @@
         </p:nvSpPr>
         <p:spPr>
           <a:xfrm>
-            <a:off x="8681025" y="2866275"/>
-            <a:ext cx="7581300" cy="4601100"/>
+            <a:off x="8436950" y="2650114"/>
+            <a:ext cx="7581300" cy="5033400"/>
           </a:xfrm>
           <a:prstGeom prst="rect">
             <a:avLst/>
@@ -19822,22 +18700,20 @@
           </a:bodyPr>
           <a:lstStyle/>
           <a:p>
-            <a:pPr indent="-431800" lvl="0" marL="457200" rtl="0" algn="l">
-              <a:spcBef>
-                <a:spcPts val="0"/>
-              </a:spcBef>
-              <a:spcAft>
-                <a:spcPts val="0"/>
-              </a:spcAft>
-              <a:buClr>
-                <a:schemeClr val="dk1"/>
-              </a:buClr>
-              <a:buSzPts val="3200"/>
-              <a:buFont typeface="Calibri"/>
-              <a:buChar char="●"/>
+            <a:pPr indent="0" lvl="0" marL="457200" rtl="0" algn="l">
+              <a:lnSpc>
+                <a:spcPct val="115000"/>
+              </a:lnSpc>
+              <a:spcBef>
+                <a:spcPts val="0"/>
+              </a:spcBef>
+              <a:spcAft>
+                <a:spcPts val="0"/>
+              </a:spcAft>
+              <a:buNone/>
             </a:pPr>
             <a:r>
-              <a:rPr lang="cs-CZ" sz="3200">
+              <a:rPr lang="cs-CZ" sz="3000">
                 <a:solidFill>
                   <a:schemeClr val="dk1"/>
                 </a:solidFill>
@@ -19849,7 +18725,7 @@
               <a:t>Social Buzz is a social </a:t>
             </a:r>
             <a:r>
-              <a:rPr lang="cs-CZ" sz="3200">
+              <a:rPr lang="cs-CZ" sz="3000">
                 <a:solidFill>
                   <a:schemeClr val="dk1"/>
                 </a:solidFill>
@@ -19861,7 +18737,7 @@
               <a:t>media</a:t>
             </a:r>
             <a:r>
-              <a:rPr lang="cs-CZ" sz="3200">
+              <a:rPr lang="cs-CZ" sz="3000">
                 <a:solidFill>
                   <a:schemeClr val="dk1"/>
                 </a:solidFill>
@@ -19870,9 +18746,9 @@
                 <a:cs typeface="Calibri"/>
                 <a:sym typeface="Calibri"/>
               </a:rPr>
-              <a:t> platform</a:t>
+              <a:t> platform who wants to adapt properly to its rapidly growing platform currently reaching 500 million active users monthly. Here are the tasks Accenture will focus on:</a:t>
             </a:r>
-            <a:endParaRPr sz="3200">
+            <a:endParaRPr sz="3000">
               <a:solidFill>
                 <a:schemeClr val="dk1"/>
               </a:solidFill>
@@ -19883,7 +18759,10 @@
             </a:endParaRPr>
           </a:p>
           <a:p>
-            <a:pPr indent="-431800" lvl="0" marL="457200" rtl="0" algn="l">
+            <a:pPr indent="-419100" lvl="0" marL="1371600" rtl="0" algn="l">
+              <a:lnSpc>
+                <a:spcPct val="115000"/>
+              </a:lnSpc>
               <a:spcBef>
                 <a:spcPts val="0"/>
               </a:spcBef>
@@ -19893,12 +18772,12 @@
               <a:buClr>
                 <a:schemeClr val="dk1"/>
               </a:buClr>
-              <a:buSzPts val="3200"/>
+              <a:buSzPts val="3000"/>
               <a:buFont typeface="Calibri"/>
               <a:buChar char="●"/>
             </a:pPr>
             <a:r>
-              <a:rPr lang="cs-CZ" sz="3200">
+              <a:rPr lang="cs-CZ" sz="3000">
                 <a:solidFill>
                   <a:schemeClr val="dk1"/>
                 </a:solidFill>
@@ -19907,9 +18786,9 @@
                 <a:cs typeface="Calibri"/>
                 <a:sym typeface="Calibri"/>
               </a:rPr>
-              <a:t>Keeps users anonymous and tracks user reactions on every piece of content</a:t>
+              <a:t>Audit of big data practices</a:t>
             </a:r>
-            <a:endParaRPr sz="3200">
+            <a:endParaRPr sz="3000">
               <a:solidFill>
                 <a:schemeClr val="dk1"/>
               </a:solidFill>
@@ -19920,7 +18799,10 @@
             </a:endParaRPr>
           </a:p>
           <a:p>
-            <a:pPr indent="-431800" lvl="0" marL="457200" rtl="0" algn="l">
+            <a:pPr indent="-419100" lvl="0" marL="1371600" rtl="0" algn="l">
+              <a:lnSpc>
+                <a:spcPct val="115000"/>
+              </a:lnSpc>
               <a:spcBef>
                 <a:spcPts val="0"/>
               </a:spcBef>
@@ -19930,12 +18812,12 @@
               <a:buClr>
                 <a:schemeClr val="dk1"/>
               </a:buClr>
-              <a:buSzPts val="3200"/>
+              <a:buSzPts val="3000"/>
               <a:buFont typeface="Calibri"/>
               <a:buChar char="●"/>
             </a:pPr>
             <a:r>
-              <a:rPr lang="cs-CZ" sz="3200">
+              <a:rPr lang="cs-CZ" sz="3000">
                 <a:solidFill>
                   <a:schemeClr val="dk1"/>
                 </a:solidFill>
@@ -19944,9 +18826,21 @@
                 <a:cs typeface="Calibri"/>
                 <a:sym typeface="Calibri"/>
               </a:rPr>
-              <a:t>Over 100 ways for users to react</a:t>
+              <a:t>Recommendations for </a:t>
             </a:r>
-            <a:endParaRPr sz="3200">
+            <a:r>
+              <a:rPr lang="cs-CZ" sz="3000">
+                <a:solidFill>
+                  <a:schemeClr val="dk1"/>
+                </a:solidFill>
+                <a:latin typeface="Calibri"/>
+                <a:ea typeface="Calibri"/>
+                <a:cs typeface="Calibri"/>
+                <a:sym typeface="Calibri"/>
+              </a:rPr>
+              <a:t>successful IPO</a:t>
+            </a:r>
+            <a:endParaRPr sz="3000">
               <a:solidFill>
                 <a:schemeClr val="dk1"/>
               </a:solidFill>
@@ -19957,7 +18851,10 @@
             </a:endParaRPr>
           </a:p>
           <a:p>
-            <a:pPr indent="-431800" lvl="0" marL="457200" rtl="0" algn="l">
+            <a:pPr indent="-419100" lvl="0" marL="1371600" rtl="0" algn="l">
+              <a:lnSpc>
+                <a:spcPct val="115000"/>
+              </a:lnSpc>
               <a:spcBef>
                 <a:spcPts val="0"/>
               </a:spcBef>
@@ -19967,12 +18864,12 @@
               <a:buClr>
                 <a:schemeClr val="dk1"/>
               </a:buClr>
-              <a:buSzPts val="3200"/>
+              <a:buSzPts val="3000"/>
               <a:buFont typeface="Calibri"/>
               <a:buChar char="●"/>
             </a:pPr>
             <a:r>
-              <a:rPr lang="cs-CZ" sz="3200">
+              <a:rPr lang="cs-CZ" sz="3000">
                 <a:solidFill>
                   <a:schemeClr val="dk1"/>
                 </a:solidFill>
@@ -19981,82 +18878,9 @@
                 <a:cs typeface="Calibri"/>
                 <a:sym typeface="Calibri"/>
               </a:rPr>
-              <a:t>Over the past 5 years, the platform has scaled very quickly and </a:t>
+              <a:t>Analysis of Social Buzz’s top 5 most popular categories</a:t>
             </a:r>
-            <a:r>
-              <a:rPr lang="cs-CZ" sz="3200">
-                <a:solidFill>
-                  <a:schemeClr val="dk1"/>
-                </a:solidFill>
-                <a:latin typeface="Calibri"/>
-                <a:ea typeface="Calibri"/>
-                <a:cs typeface="Calibri"/>
-                <a:sym typeface="Calibri"/>
-              </a:rPr>
-              <a:t>reaches</a:t>
-            </a:r>
-            <a:r>
-              <a:rPr lang="cs-CZ" sz="3200">
-                <a:solidFill>
-                  <a:schemeClr val="dk1"/>
-                </a:solidFill>
-                <a:latin typeface="Calibri"/>
-                <a:ea typeface="Calibri"/>
-                <a:cs typeface="Calibri"/>
-                <a:sym typeface="Calibri"/>
-              </a:rPr>
-              <a:t> over 500 million active users </a:t>
-            </a:r>
-            <a:r>
-              <a:rPr lang="cs-CZ" sz="3200">
-                <a:solidFill>
-                  <a:schemeClr val="dk1"/>
-                </a:solidFill>
-                <a:latin typeface="Calibri"/>
-                <a:ea typeface="Calibri"/>
-                <a:cs typeface="Calibri"/>
-                <a:sym typeface="Calibri"/>
-              </a:rPr>
-              <a:t>monthly</a:t>
-            </a:r>
-            <a:endParaRPr sz="3200">
-              <a:solidFill>
-                <a:schemeClr val="dk1"/>
-              </a:solidFill>
-              <a:latin typeface="Calibri"/>
-              <a:ea typeface="Calibri"/>
-              <a:cs typeface="Calibri"/>
-              <a:sym typeface="Calibri"/>
-            </a:endParaRPr>
-          </a:p>
-          <a:p>
-            <a:pPr indent="-431800" lvl="0" marL="457200" rtl="0" algn="l">
-              <a:spcBef>
-                <a:spcPts val="0"/>
-              </a:spcBef>
-              <a:spcAft>
-                <a:spcPts val="0"/>
-              </a:spcAft>
-              <a:buClr>
-                <a:schemeClr val="dk1"/>
-              </a:buClr>
-              <a:buSzPts val="3200"/>
-              <a:buFont typeface="Calibri"/>
-              <a:buChar char="●"/>
-            </a:pPr>
-            <a:r>
-              <a:rPr lang="cs-CZ" sz="3200">
-                <a:solidFill>
-                  <a:schemeClr val="dk1"/>
-                </a:solidFill>
-                <a:latin typeface="Calibri"/>
-                <a:ea typeface="Calibri"/>
-                <a:cs typeface="Calibri"/>
-                <a:sym typeface="Calibri"/>
-              </a:rPr>
-              <a:t>Over 100,000 pieces of content and data is made daily</a:t>
-            </a:r>
-            <a:endParaRPr sz="3200">
+            <a:endParaRPr sz="3000">
               <a:solidFill>
                 <a:schemeClr val="dk1"/>
               </a:solidFill>
@@ -20786,18 +19610,18 @@
             <a:r>
               <a:rPr lang="cs-CZ" sz="3600">
                 <a:solidFill>
-                  <a:schemeClr val="dk1"/>
+                  <a:srgbClr val="FFFFFF"/>
                 </a:solidFill>
                 <a:latin typeface="Calibri"/>
                 <a:ea typeface="Calibri"/>
                 <a:cs typeface="Calibri"/>
                 <a:sym typeface="Calibri"/>
               </a:rPr>
-              <a:t>With over 100,000 posts every day that makes about 3,000,000 pieces of content every month</a:t>
+              <a:t>With over 100,000 posts every day that makes about 3,000,000 posts a month.</a:t>
             </a:r>
             <a:endParaRPr sz="3600">
               <a:solidFill>
-                <a:schemeClr val="dk1"/>
+                <a:srgbClr val="FFFFFF"/>
               </a:solidFill>
               <a:latin typeface="Calibri"/>
               <a:ea typeface="Calibri"/>
@@ -20820,7 +19644,7 @@
             </a:r>
             <a:endParaRPr sz="3600">
               <a:solidFill>
-                <a:schemeClr val="dk1"/>
+                <a:srgbClr val="FFFFFF"/>
               </a:solidFill>
               <a:latin typeface="Calibri"/>
               <a:ea typeface="Calibri"/>
@@ -20841,19 +19665,19 @@
             <a:r>
               <a:rPr lang="cs-CZ" sz="3600">
                 <a:solidFill>
-                  <a:schemeClr val="dk1"/>
+                  <a:srgbClr val="FFFFFF"/>
                 </a:solidFill>
                 <a:latin typeface="Calibri"/>
                 <a:ea typeface="Calibri"/>
                 <a:cs typeface="Calibri"/>
                 <a:sym typeface="Calibri"/>
               </a:rPr>
-              <a:t>To determine the areas of interest, lets find the most popular </a:t>
+              <a:t>To determine the best course of action, lets find the popular </a:t>
             </a:r>
             <a:r>
               <a:rPr lang="cs-CZ" sz="3600">
                 <a:solidFill>
-                  <a:schemeClr val="dk1"/>
+                  <a:srgbClr val="FFFFFF"/>
                 </a:solidFill>
                 <a:latin typeface="Calibri"/>
                 <a:ea typeface="Calibri"/>
@@ -20865,7 +19689,7 @@
             <a:r>
               <a:rPr lang="cs-CZ" sz="3600">
                 <a:solidFill>
-                  <a:schemeClr val="dk1"/>
+                  <a:srgbClr val="FFFFFF"/>
                 </a:solidFill>
                 <a:latin typeface="Calibri"/>
                 <a:ea typeface="Calibri"/>
@@ -20876,7 +19700,7 @@
             </a:r>
             <a:endParaRPr sz="3600">
               <a:solidFill>
-                <a:schemeClr val="dk1"/>
+                <a:srgbClr val="FFFFFF"/>
               </a:solidFill>
               <a:latin typeface="Calibri"/>
               <a:ea typeface="Calibri"/>
@@ -23718,7 +22542,7 @@
         </p:nvSpPr>
         <p:spPr>
           <a:xfrm>
-            <a:off x="3860350" y="1434925"/>
+            <a:off x="3860350" y="1231800"/>
             <a:ext cx="7581300" cy="1231200"/>
           </a:xfrm>
           <a:prstGeom prst="rect">
@@ -23797,14 +22621,14 @@
             <a:r>
               <a:rPr lang="cs-CZ" sz="3200">
                 <a:solidFill>
-                  <a:schemeClr val="dk1"/>
+                  <a:srgbClr val="FFFFFF"/>
                 </a:solidFill>
               </a:rPr>
               <a:t>Cleaning the datasets</a:t>
             </a:r>
             <a:endParaRPr sz="3200">
               <a:solidFill>
-                <a:schemeClr val="dk1"/>
+                <a:srgbClr val="FFFFFF"/>
               </a:solidFill>
             </a:endParaRPr>
           </a:p>
@@ -24292,7 +23116,7 @@
         </p:blipFill>
         <p:spPr>
           <a:xfrm>
-            <a:off x="7272183" y="6480309"/>
+            <a:off x="7398758" y="6480309"/>
             <a:ext cx="2972220" cy="881758"/>
           </a:xfrm>
           <a:prstGeom prst="rect">
@@ -24339,8 +23163,8 @@
         </p:nvSpPr>
         <p:spPr>
           <a:xfrm>
-            <a:off x="1795113" y="2641675"/>
-            <a:ext cx="3636300" cy="3667200"/>
+            <a:off x="1566213" y="5625175"/>
+            <a:ext cx="4094100" cy="683700"/>
           </a:xfrm>
           <a:prstGeom prst="rect">
             <a:avLst/>
@@ -24374,162 +23198,7 @@
                   <a:schemeClr val="dk1"/>
                 </a:solidFill>
               </a:rPr>
-              <a:t>Most Popular Categories</a:t>
-            </a:r>
-            <a:endParaRPr sz="2900">
-              <a:solidFill>
-                <a:schemeClr val="dk1"/>
-              </a:solidFill>
-            </a:endParaRPr>
-          </a:p>
-          <a:p>
-            <a:pPr indent="-412750" lvl="0" marL="457200" rtl="0" algn="l">
-              <a:lnSpc>
-                <a:spcPct val="115000"/>
-              </a:lnSpc>
-              <a:spcBef>
-                <a:spcPts val="0"/>
-              </a:spcBef>
-              <a:spcAft>
-                <a:spcPts val="0"/>
-              </a:spcAft>
-              <a:buClr>
-                <a:schemeClr val="dk1"/>
-              </a:buClr>
-              <a:buSzPts val="2900"/>
-              <a:buAutoNum type="arabicPeriod"/>
-            </a:pPr>
-            <a:r>
-              <a:rPr lang="cs-CZ" sz="2900">
-                <a:solidFill>
-                  <a:schemeClr val="dk1"/>
-                </a:solidFill>
-              </a:rPr>
-              <a:t>Travel</a:t>
-            </a:r>
-            <a:endParaRPr sz="2900">
-              <a:solidFill>
-                <a:schemeClr val="dk1"/>
-              </a:solidFill>
-            </a:endParaRPr>
-          </a:p>
-          <a:p>
-            <a:pPr indent="-412750" lvl="0" marL="457200" rtl="0" algn="l">
-              <a:lnSpc>
-                <a:spcPct val="115000"/>
-              </a:lnSpc>
-              <a:spcBef>
-                <a:spcPts val="0"/>
-              </a:spcBef>
-              <a:spcAft>
-                <a:spcPts val="0"/>
-              </a:spcAft>
-              <a:buClr>
-                <a:schemeClr val="dk1"/>
-              </a:buClr>
-              <a:buSzPts val="2900"/>
-              <a:buAutoNum type="arabicPeriod"/>
-            </a:pPr>
-            <a:r>
-              <a:rPr lang="cs-CZ" sz="2900">
-                <a:solidFill>
-                  <a:schemeClr val="dk1"/>
-                </a:solidFill>
-              </a:rPr>
-              <a:t>Science</a:t>
-            </a:r>
-            <a:endParaRPr sz="2900">
-              <a:solidFill>
-                <a:schemeClr val="dk1"/>
-              </a:solidFill>
-            </a:endParaRPr>
-          </a:p>
-          <a:p>
-            <a:pPr indent="-412750" lvl="0" marL="457200" rtl="0" algn="l">
-              <a:lnSpc>
-                <a:spcPct val="115000"/>
-              </a:lnSpc>
-              <a:spcBef>
-                <a:spcPts val="0"/>
-              </a:spcBef>
-              <a:spcAft>
-                <a:spcPts val="0"/>
-              </a:spcAft>
-              <a:buClr>
-                <a:schemeClr val="dk1"/>
-              </a:buClr>
-              <a:buSzPts val="2900"/>
-              <a:buAutoNum type="arabicPeriod"/>
-            </a:pPr>
-            <a:r>
-              <a:rPr lang="cs-CZ" sz="2900">
-                <a:solidFill>
-                  <a:schemeClr val="dk1"/>
-                </a:solidFill>
-              </a:rPr>
-              <a:t>Healthy Eating</a:t>
-            </a:r>
-            <a:endParaRPr sz="2900">
-              <a:solidFill>
-                <a:schemeClr val="dk1"/>
-              </a:solidFill>
-            </a:endParaRPr>
-          </a:p>
-          <a:p>
-            <a:pPr indent="-412750" lvl="0" marL="457200" rtl="0" algn="l">
-              <a:lnSpc>
-                <a:spcPct val="115000"/>
-              </a:lnSpc>
-              <a:spcBef>
-                <a:spcPts val="0"/>
-              </a:spcBef>
-              <a:spcAft>
-                <a:spcPts val="0"/>
-              </a:spcAft>
-              <a:buClr>
-                <a:schemeClr val="dk1"/>
-              </a:buClr>
-              <a:buSzPts val="2900"/>
-              <a:buAutoNum type="arabicPeriod"/>
-            </a:pPr>
-            <a:r>
-              <a:rPr lang="cs-CZ" sz="2900">
-                <a:solidFill>
-                  <a:schemeClr val="dk1"/>
-                </a:solidFill>
-              </a:rPr>
-              <a:t>Animals</a:t>
-            </a:r>
-            <a:endParaRPr sz="2900">
-              <a:solidFill>
-                <a:schemeClr val="dk1"/>
-              </a:solidFill>
-            </a:endParaRPr>
-          </a:p>
-          <a:p>
-            <a:pPr indent="-412750" lvl="0" marL="457200" rtl="0" algn="l">
-              <a:lnSpc>
-                <a:spcPct val="115000"/>
-              </a:lnSpc>
-              <a:spcBef>
-                <a:spcPts val="0"/>
-              </a:spcBef>
-              <a:spcAft>
-                <a:spcPts val="0"/>
-              </a:spcAft>
-              <a:buClr>
-                <a:schemeClr val="dk1"/>
-              </a:buClr>
-              <a:buSzPts val="2900"/>
-              <a:buAutoNum type="arabicPeriod"/>
-            </a:pPr>
-            <a:r>
-              <a:rPr lang="cs-CZ" sz="2900">
-                <a:solidFill>
-                  <a:schemeClr val="dk1"/>
-                </a:solidFill>
-              </a:rPr>
-              <a:t>Cooking</a:t>
+              <a:t>Most Popular Category</a:t>
             </a:r>
             <a:endParaRPr sz="2900">
               <a:solidFill>
@@ -24547,8 +23216,8 @@
         </p:nvSpPr>
         <p:spPr>
           <a:xfrm>
-            <a:off x="6940125" y="2641675"/>
-            <a:ext cx="3636300" cy="3667200"/>
+            <a:off x="7012413" y="5351425"/>
+            <a:ext cx="3744900" cy="1231200"/>
           </a:xfrm>
           <a:prstGeom prst="rect">
             <a:avLst/>
@@ -24582,131 +23251,7 @@
                   <a:schemeClr val="dk1"/>
                 </a:solidFill>
               </a:rPr>
-              <a:t>Content Types Popularity</a:t>
-            </a:r>
-            <a:endParaRPr sz="2900">
-              <a:solidFill>
-                <a:schemeClr val="dk1"/>
-              </a:solidFill>
-            </a:endParaRPr>
-          </a:p>
-          <a:p>
-            <a:pPr indent="-412750" lvl="0" marL="457200" rtl="0" algn="l">
-              <a:lnSpc>
-                <a:spcPct val="115000"/>
-              </a:lnSpc>
-              <a:spcBef>
-                <a:spcPts val="0"/>
-              </a:spcBef>
-              <a:spcAft>
-                <a:spcPts val="0"/>
-              </a:spcAft>
-              <a:buClr>
-                <a:schemeClr val="dk1"/>
-              </a:buClr>
-              <a:buSzPts val="2900"/>
-              <a:buAutoNum type="arabicPeriod"/>
-            </a:pPr>
-            <a:r>
-              <a:rPr lang="cs-CZ" sz="2900">
-                <a:solidFill>
-                  <a:schemeClr val="dk1"/>
-                </a:solidFill>
-              </a:rPr>
-              <a:t>Photo</a:t>
-            </a:r>
-            <a:endParaRPr sz="2900">
-              <a:solidFill>
-                <a:schemeClr val="dk1"/>
-              </a:solidFill>
-            </a:endParaRPr>
-          </a:p>
-          <a:p>
-            <a:pPr indent="-412750" lvl="0" marL="457200" rtl="0" algn="l">
-              <a:lnSpc>
-                <a:spcPct val="115000"/>
-              </a:lnSpc>
-              <a:spcBef>
-                <a:spcPts val="0"/>
-              </a:spcBef>
-              <a:spcAft>
-                <a:spcPts val="0"/>
-              </a:spcAft>
-              <a:buClr>
-                <a:schemeClr val="dk1"/>
-              </a:buClr>
-              <a:buSzPts val="2900"/>
-              <a:buAutoNum type="arabicPeriod"/>
-            </a:pPr>
-            <a:r>
-              <a:rPr lang="cs-CZ" sz="2900">
-                <a:solidFill>
-                  <a:schemeClr val="dk1"/>
-                </a:solidFill>
-              </a:rPr>
-              <a:t>Video</a:t>
-            </a:r>
-            <a:endParaRPr sz="2900">
-              <a:solidFill>
-                <a:schemeClr val="dk1"/>
-              </a:solidFill>
-            </a:endParaRPr>
-          </a:p>
-          <a:p>
-            <a:pPr indent="-412750" lvl="0" marL="457200" rtl="0" algn="l">
-              <a:lnSpc>
-                <a:spcPct val="115000"/>
-              </a:lnSpc>
-              <a:spcBef>
-                <a:spcPts val="0"/>
-              </a:spcBef>
-              <a:spcAft>
-                <a:spcPts val="0"/>
-              </a:spcAft>
-              <a:buClr>
-                <a:schemeClr val="dk1"/>
-              </a:buClr>
-              <a:buSzPts val="2900"/>
-              <a:buAutoNum type="arabicPeriod"/>
-            </a:pPr>
-            <a:r>
-              <a:rPr lang="cs-CZ" sz="2900">
-                <a:solidFill>
-                  <a:schemeClr val="dk1"/>
-                </a:solidFill>
-              </a:rPr>
-              <a:t>GIF</a:t>
-            </a:r>
-            <a:endParaRPr sz="2900">
-              <a:solidFill>
-                <a:schemeClr val="dk1"/>
-              </a:solidFill>
-            </a:endParaRPr>
-          </a:p>
-          <a:p>
-            <a:pPr indent="-412750" lvl="0" marL="457200" rtl="0" algn="l">
-              <a:lnSpc>
-                <a:spcPct val="115000"/>
-              </a:lnSpc>
-              <a:spcBef>
-                <a:spcPts val="0"/>
-              </a:spcBef>
-              <a:spcAft>
-                <a:spcPts val="0"/>
-              </a:spcAft>
-              <a:buClr>
-                <a:schemeClr val="dk1"/>
-              </a:buClr>
-              <a:buSzPts val="2900"/>
-              <a:buAutoNum type="arabicPeriod"/>
-            </a:pPr>
-            <a:r>
-              <a:rPr lang="cs-CZ" sz="2900">
-                <a:solidFill>
-                  <a:schemeClr val="dk1"/>
-                </a:solidFill>
-              </a:rPr>
-              <a:t>Audio</a:t>
+              <a:t>Most Popular Content Type</a:t>
             </a:r>
             <a:endParaRPr sz="2900">
               <a:solidFill>
@@ -24724,8 +23269,61 @@
         </p:nvSpPr>
         <p:spPr>
           <a:xfrm>
-            <a:off x="12338288" y="2641675"/>
-            <a:ext cx="3636300" cy="3667200"/>
+            <a:off x="12284000" y="5625175"/>
+            <a:ext cx="3744900" cy="683700"/>
+          </a:xfrm>
+          <a:prstGeom prst="rect">
+            <a:avLst/>
+          </a:prstGeom>
+          <a:noFill/>
+          <a:ln>
+            <a:noFill/>
+          </a:ln>
+        </p:spPr>
+        <p:txBody>
+          <a:bodyPr anchorCtr="0" anchor="t" bIns="91425" lIns="91425" spcFirstLastPara="1" rIns="91425" wrap="square" tIns="91425">
+            <a:noAutofit/>
+          </a:bodyPr>
+          <a:lstStyle/>
+          <a:p>
+            <a:pPr indent="0" lvl="0" marL="0" rtl="0" algn="l">
+              <a:lnSpc>
+                <a:spcPct val="115000"/>
+              </a:lnSpc>
+              <a:spcBef>
+                <a:spcPts val="0"/>
+              </a:spcBef>
+              <a:spcAft>
+                <a:spcPts val="0"/>
+              </a:spcAft>
+              <a:buNone/>
+            </a:pPr>
+            <a:r>
+              <a:rPr lang="cs-CZ" sz="2900">
+                <a:solidFill>
+                  <a:schemeClr val="dk1"/>
+                </a:solidFill>
+              </a:rPr>
+              <a:t>Hour With Most Posts</a:t>
+            </a:r>
+            <a:endParaRPr sz="2900">
+              <a:solidFill>
+                <a:schemeClr val="dk1"/>
+              </a:solidFill>
+            </a:endParaRPr>
+          </a:p>
+        </p:txBody>
+      </p:sp>
+      <p:sp>
+        <p:nvSpPr>
+          <p:cNvPr id="316" name="Google Shape;316;p19"/>
+          <p:cNvSpPr txBox="1"/>
+          <p:nvPr/>
+        </p:nvSpPr>
+        <p:spPr>
+          <a:xfrm>
+            <a:off x="12078200" y="3309875"/>
+            <a:ext cx="4156500" cy="1320900"/>
           </a:xfrm>
           <a:prstGeom prst="rect">
             <a:avLst/>
@@ -24742,9 +23340,6 @@
           <a:lstStyle/>
           <a:p>
             <a:pPr indent="0" lvl="0" marL="0" rtl="0" algn="ctr">
-              <a:lnSpc>
-                <a:spcPct val="115000"/>
-              </a:lnSpc>
               <a:spcBef>
                 <a:spcPts val="0"/>
               </a:spcBef>
@@ -24754,138 +23349,114 @@
               <a:buNone/>
             </a:pPr>
             <a:r>
-              <a:rPr lang="cs-CZ" sz="2900">
+              <a:rPr lang="cs-CZ" sz="7200">
                 <a:solidFill>
                   <a:schemeClr val="dk1"/>
                 </a:solidFill>
               </a:rPr>
-              <a:t>Month with most posts and/or highest Popularity</a:t>
+              <a:t>11:00 PM</a:t>
             </a:r>
-            <a:endParaRPr sz="2900">
+            <a:endParaRPr sz="7200">
               <a:solidFill>
                 <a:schemeClr val="dk1"/>
               </a:solidFill>
             </a:endParaRPr>
           </a:p>
+        </p:txBody>
+      </p:sp>
+      <p:sp>
+        <p:nvSpPr>
+          <p:cNvPr id="317" name="Google Shape;317;p19"/>
+          <p:cNvSpPr txBox="1"/>
+          <p:nvPr/>
+        </p:nvSpPr>
+        <p:spPr>
+          <a:xfrm>
+            <a:off x="6806613" y="3309875"/>
+            <a:ext cx="4156500" cy="1320900"/>
+          </a:xfrm>
+          <a:prstGeom prst="rect">
+            <a:avLst/>
+          </a:prstGeom>
+          <a:noFill/>
+          <a:ln>
+            <a:noFill/>
+          </a:ln>
+        </p:spPr>
+        <p:txBody>
+          <a:bodyPr anchorCtr="0" anchor="t" bIns="91425" lIns="91425" spcFirstLastPara="1" rIns="91425" wrap="square" tIns="91425">
+            <a:noAutofit/>
+          </a:bodyPr>
+          <a:lstStyle/>
           <a:p>
-            <a:pPr indent="-412750" lvl="0" marL="457200" rtl="0" algn="l">
-              <a:lnSpc>
-                <a:spcPct val="115000"/>
-              </a:lnSpc>
-              <a:spcBef>
-                <a:spcPts val="0"/>
-              </a:spcBef>
-              <a:spcAft>
-                <a:spcPts val="0"/>
-              </a:spcAft>
-              <a:buClr>
-                <a:schemeClr val="dk1"/>
-              </a:buClr>
-              <a:buSzPts val="2900"/>
-              <a:buChar char="●"/>
+            <a:pPr indent="0" lvl="0" marL="0" rtl="0" algn="ctr">
+              <a:spcBef>
+                <a:spcPts val="0"/>
+              </a:spcBef>
+              <a:spcAft>
+                <a:spcPts val="0"/>
+              </a:spcAft>
+              <a:buNone/>
             </a:pPr>
             <a:r>
-              <a:rPr lang="cs-CZ" sz="2900">
+              <a:rPr lang="cs-CZ" sz="7200">
                 <a:solidFill>
                   <a:schemeClr val="dk1"/>
                 </a:solidFill>
               </a:rPr>
-              <a:t>August</a:t>
+              <a:t>Photo</a:t>
             </a:r>
-            <a:endParaRPr sz="2900">
+            <a:endParaRPr sz="7200">
               <a:solidFill>
                 <a:schemeClr val="dk1"/>
               </a:solidFill>
             </a:endParaRPr>
           </a:p>
+        </p:txBody>
+      </p:sp>
+      <p:sp>
+        <p:nvSpPr>
+          <p:cNvPr id="318" name="Google Shape;318;p19"/>
+          <p:cNvSpPr txBox="1"/>
+          <p:nvPr/>
+        </p:nvSpPr>
+        <p:spPr>
+          <a:xfrm>
+            <a:off x="1878062" y="3309875"/>
+            <a:ext cx="3470400" cy="1320900"/>
+          </a:xfrm>
+          <a:prstGeom prst="rect">
+            <a:avLst/>
+          </a:prstGeom>
+          <a:noFill/>
+          <a:ln>
+            <a:noFill/>
+          </a:ln>
+        </p:spPr>
+        <p:txBody>
+          <a:bodyPr anchorCtr="0" anchor="t" bIns="91425" lIns="91425" spcFirstLastPara="1" rIns="91425" wrap="square" tIns="91425">
+            <a:noAutofit/>
+          </a:bodyPr>
+          <a:lstStyle/>
           <a:p>
-            <a:pPr indent="-412750" lvl="0" marL="457200" rtl="0" algn="l">
-              <a:lnSpc>
-                <a:spcPct val="115000"/>
-              </a:lnSpc>
-              <a:spcBef>
-                <a:spcPts val="0"/>
-              </a:spcBef>
-              <a:spcAft>
-                <a:spcPts val="0"/>
-              </a:spcAft>
-              <a:buClr>
-                <a:schemeClr val="dk1"/>
-              </a:buClr>
-              <a:buSzPts val="2900"/>
-              <a:buChar char="●"/>
+            <a:pPr indent="0" lvl="0" marL="0" rtl="0" algn="ctr">
+              <a:spcBef>
+                <a:spcPts val="0"/>
+              </a:spcBef>
+              <a:spcAft>
+                <a:spcPts val="0"/>
+              </a:spcAft>
+              <a:buNone/>
             </a:pPr>
             <a:r>
-              <a:rPr lang="cs-CZ" sz="2900">
+              <a:rPr lang="cs-CZ" sz="7200">
                 <a:solidFill>
                   <a:schemeClr val="dk1"/>
                 </a:solidFill>
               </a:rPr>
-              <a:t>October</a:t>
+              <a:t>Travel</a:t>
             </a:r>
-            <a:endParaRPr sz="2900">
-              <a:solidFill>
-                <a:schemeClr val="dk1"/>
-              </a:solidFill>
-            </a:endParaRPr>
-          </a:p>
-          <a:p>
-            <a:pPr indent="-412750" lvl="0" marL="457200" rtl="0" algn="l">
-              <a:lnSpc>
-                <a:spcPct val="115000"/>
-              </a:lnSpc>
-              <a:spcBef>
-                <a:spcPts val="0"/>
-              </a:spcBef>
-              <a:spcAft>
-                <a:spcPts val="0"/>
-              </a:spcAft>
-              <a:buClr>
-                <a:schemeClr val="dk1"/>
-              </a:buClr>
-              <a:buSzPts val="2900"/>
-              <a:buChar char="●"/>
-            </a:pPr>
-            <a:r>
-              <a:rPr lang="cs-CZ" sz="2900">
-                <a:solidFill>
-                  <a:schemeClr val="dk1"/>
-                </a:solidFill>
-              </a:rPr>
-              <a:t>January</a:t>
-            </a:r>
-            <a:endParaRPr sz="2900">
-              <a:solidFill>
-                <a:schemeClr val="dk1"/>
-              </a:solidFill>
-            </a:endParaRPr>
-          </a:p>
-          <a:p>
-            <a:pPr indent="-412750" lvl="0" marL="457200" rtl="0" algn="l">
-              <a:lnSpc>
-                <a:spcPct val="115000"/>
-              </a:lnSpc>
-              <a:spcBef>
-                <a:spcPts val="0"/>
-              </a:spcBef>
-              <a:spcAft>
-                <a:spcPts val="0"/>
-              </a:spcAft>
-              <a:buClr>
-                <a:schemeClr val="dk1"/>
-              </a:buClr>
-              <a:buSzPts val="2900"/>
-              <a:buChar char="●"/>
-            </a:pPr>
-            <a:r>
-              <a:rPr lang="cs-CZ" sz="2900">
-                <a:solidFill>
-                  <a:schemeClr val="dk1"/>
-                </a:solidFill>
-              </a:rPr>
-              <a:t>May</a:t>
-            </a:r>
-            <a:endParaRPr sz="2900">
+            <a:endParaRPr sz="7200">
               <a:solidFill>
                 <a:schemeClr val="dk1"/>
               </a:solidFill>
@@ -24906,7 +23477,7 @@
   <p:cSld>
     <p:spTree>
       <p:nvGrpSpPr>
-        <p:cNvPr id="323" name="Shape 323"/>
+        <p:cNvPr id="326" name="Shape 326"/>
         <p:cNvGrpSpPr/>
         <p:nvPr/>
       </p:nvGrpSpPr>
@@ -24920,7 +23491,7 @@
       </p:grpSpPr>
       <p:grpSp>
         <p:nvGrpSpPr>
-          <p:cNvPr id="324" name="Google Shape;324;p20"/>
+          <p:cNvPr id="327" name="Google Shape;327;p20"/>
           <p:cNvGrpSpPr/>
           <p:nvPr/>
         </p:nvGrpSpPr>
@@ -24932,87 +23503,6 @@
             <a:chExt cx="23005033" cy="2689440"/>
           </a:xfrm>
         </p:grpSpPr>
-        <p:pic>
-          <p:nvPicPr>
-            <p:cNvPr id="325" name="Google Shape;325;p20"/>
-            <p:cNvPicPr preferRelativeResize="0"/>
-            <p:nvPr/>
-          </p:nvPicPr>
-          <p:blipFill rotWithShape="1">
-            <a:blip r:embed="rId3">
-              <a:alphaModFix amt="80000"/>
-            </a:blip>
-            <a:srcRect b="0" l="0" r="0" t="0"/>
-            <a:stretch/>
-          </p:blipFill>
-          <p:spPr>
-            <a:xfrm>
-              <a:off x="16760969" y="0"/>
-              <a:ext cx="2891870" cy="2689440"/>
-            </a:xfrm>
-            <a:prstGeom prst="rect">
-              <a:avLst/>
-            </a:prstGeom>
-            <a:noFill/>
-            <a:ln>
-              <a:noFill/>
-            </a:ln>
-          </p:spPr>
-        </p:pic>
-        <p:pic>
-          <p:nvPicPr>
-            <p:cNvPr id="326" name="Google Shape;326;p20"/>
-            <p:cNvPicPr preferRelativeResize="0"/>
-            <p:nvPr/>
-          </p:nvPicPr>
-          <p:blipFill rotWithShape="1">
-            <a:blip r:embed="rId3">
-              <a:alphaModFix amt="80000"/>
-            </a:blip>
-            <a:srcRect b="0" l="0" r="0" t="0"/>
-            <a:stretch/>
-          </p:blipFill>
-          <p:spPr>
-            <a:xfrm>
-              <a:off x="13408776" y="0"/>
-              <a:ext cx="2891870" cy="2689440"/>
-            </a:xfrm>
-            <a:prstGeom prst="rect">
-              <a:avLst/>
-            </a:prstGeom>
-            <a:noFill/>
-            <a:ln>
-              <a:noFill/>
-            </a:ln>
-          </p:spPr>
-        </p:pic>
-        <p:pic>
-          <p:nvPicPr>
-            <p:cNvPr id="327" name="Google Shape;327;p20"/>
-            <p:cNvPicPr preferRelativeResize="0"/>
-            <p:nvPr/>
-          </p:nvPicPr>
-          <p:blipFill rotWithShape="1">
-            <a:blip r:embed="rId3">
-              <a:alphaModFix amt="80000"/>
-            </a:blip>
-            <a:srcRect b="0" l="0" r="0" t="0"/>
-            <a:stretch/>
-          </p:blipFill>
-          <p:spPr>
-            <a:xfrm>
-              <a:off x="10056582" y="0"/>
-              <a:ext cx="2891870" cy="2689440"/>
-            </a:xfrm>
-            <a:prstGeom prst="rect">
-              <a:avLst/>
-            </a:prstGeom>
-            <a:noFill/>
-            <a:ln>
-              <a:noFill/>
-            </a:ln>
-          </p:spPr>
-        </p:pic>
         <p:pic>
           <p:nvPicPr>
             <p:cNvPr id="328" name="Google Shape;328;p20"/>
@@ -25028,7 +23518,7 @@
           </p:blipFill>
           <p:spPr>
             <a:xfrm>
-              <a:off x="20113163" y="0"/>
+              <a:off x="16760969" y="0"/>
               <a:ext cx="2891870" cy="2689440"/>
             </a:xfrm>
             <a:prstGeom prst="rect">
@@ -25055,7 +23545,7 @@
           </p:blipFill>
           <p:spPr>
             <a:xfrm>
-              <a:off x="6704388" y="0"/>
+              <a:off x="13408776" y="0"/>
               <a:ext cx="2891870" cy="2689440"/>
             </a:xfrm>
             <a:prstGeom prst="rect">
@@ -25082,7 +23572,7 @@
           </p:blipFill>
           <p:spPr>
             <a:xfrm>
-              <a:off x="3352194" y="0"/>
+              <a:off x="10056582" y="0"/>
               <a:ext cx="2891870" cy="2689440"/>
             </a:xfrm>
             <a:prstGeom prst="rect">
@@ -25109,6 +23599,87 @@
           </p:blipFill>
           <p:spPr>
             <a:xfrm>
+              <a:off x="20113163" y="0"/>
+              <a:ext cx="2891870" cy="2689440"/>
+            </a:xfrm>
+            <a:prstGeom prst="rect">
+              <a:avLst/>
+            </a:prstGeom>
+            <a:noFill/>
+            <a:ln>
+              <a:noFill/>
+            </a:ln>
+          </p:spPr>
+        </p:pic>
+        <p:pic>
+          <p:nvPicPr>
+            <p:cNvPr id="332" name="Google Shape;332;p20"/>
+            <p:cNvPicPr preferRelativeResize="0"/>
+            <p:nvPr/>
+          </p:nvPicPr>
+          <p:blipFill rotWithShape="1">
+            <a:blip r:embed="rId3">
+              <a:alphaModFix amt="80000"/>
+            </a:blip>
+            <a:srcRect b="0" l="0" r="0" t="0"/>
+            <a:stretch/>
+          </p:blipFill>
+          <p:spPr>
+            <a:xfrm>
+              <a:off x="6704388" y="0"/>
+              <a:ext cx="2891870" cy="2689440"/>
+            </a:xfrm>
+            <a:prstGeom prst="rect">
+              <a:avLst/>
+            </a:prstGeom>
+            <a:noFill/>
+            <a:ln>
+              <a:noFill/>
+            </a:ln>
+          </p:spPr>
+        </p:pic>
+        <p:pic>
+          <p:nvPicPr>
+            <p:cNvPr id="333" name="Google Shape;333;p20"/>
+            <p:cNvPicPr preferRelativeResize="0"/>
+            <p:nvPr/>
+          </p:nvPicPr>
+          <p:blipFill rotWithShape="1">
+            <a:blip r:embed="rId3">
+              <a:alphaModFix amt="80000"/>
+            </a:blip>
+            <a:srcRect b="0" l="0" r="0" t="0"/>
+            <a:stretch/>
+          </p:blipFill>
+          <p:spPr>
+            <a:xfrm>
+              <a:off x="3352194" y="0"/>
+              <a:ext cx="2891870" cy="2689440"/>
+            </a:xfrm>
+            <a:prstGeom prst="rect">
+              <a:avLst/>
+            </a:prstGeom>
+            <a:noFill/>
+            <a:ln>
+              <a:noFill/>
+            </a:ln>
+          </p:spPr>
+        </p:pic>
+        <p:pic>
+          <p:nvPicPr>
+            <p:cNvPr id="334" name="Google Shape;334;p20"/>
+            <p:cNvPicPr preferRelativeResize="0"/>
+            <p:nvPr/>
+          </p:nvPicPr>
+          <p:blipFill rotWithShape="1">
+            <a:blip r:embed="rId3">
+              <a:alphaModFix amt="80000"/>
+            </a:blip>
+            <a:srcRect b="0" l="0" r="0" t="0"/>
+            <a:stretch/>
+          </p:blipFill>
+          <p:spPr>
+            <a:xfrm>
               <a:off x="0" y="0"/>
               <a:ext cx="2891870" cy="2689440"/>
             </a:xfrm>
@@ -25124,7 +23695,7 @@
       </p:grpSp>
       <p:grpSp>
         <p:nvGrpSpPr>
-          <p:cNvPr id="332" name="Google Shape;332;p20"/>
+          <p:cNvPr id="335" name="Google Shape;335;p20"/>
           <p:cNvGrpSpPr/>
           <p:nvPr/>
         </p:nvGrpSpPr>
@@ -25138,7 +23709,7 @@
         </p:grpSpPr>
         <p:sp>
           <p:nvSpPr>
-            <p:cNvPr id="333" name="Google Shape;333;p20"/>
+            <p:cNvPr id="336" name="Google Shape;336;p20"/>
             <p:cNvSpPr/>
             <p:nvPr/>
           </p:nvSpPr>
@@ -25209,7 +23780,7 @@
         </p:sp>
         <p:pic>
           <p:nvPicPr>
-            <p:cNvPr id="334" name="Google Shape;334;p20"/>
+            <p:cNvPr id="337" name="Google Shape;337;p20"/>
             <p:cNvPicPr preferRelativeResize="0"/>
             <p:nvPr/>
           </p:nvPicPr>
@@ -25237,7 +23808,7 @@
       </p:grpSp>
       <p:grpSp>
         <p:nvGrpSpPr>
-          <p:cNvPr id="335" name="Google Shape;335;p20"/>
+          <p:cNvPr id="338" name="Google Shape;338;p20"/>
           <p:cNvGrpSpPr/>
           <p:nvPr/>
         </p:nvGrpSpPr>
@@ -25249,87 +23820,6 @@
             <a:chExt cx="23005033" cy="2689440"/>
           </a:xfrm>
         </p:grpSpPr>
-        <p:pic>
-          <p:nvPicPr>
-            <p:cNvPr id="336" name="Google Shape;336;p20"/>
-            <p:cNvPicPr preferRelativeResize="0"/>
-            <p:nvPr/>
-          </p:nvPicPr>
-          <p:blipFill rotWithShape="1">
-            <a:blip r:embed="rId3">
-              <a:alphaModFix amt="80000"/>
-            </a:blip>
-            <a:srcRect b="0" l="0" r="0" t="0"/>
-            <a:stretch/>
-          </p:blipFill>
-          <p:spPr>
-            <a:xfrm>
-              <a:off x="16760969" y="0"/>
-              <a:ext cx="2891870" cy="2689440"/>
-            </a:xfrm>
-            <a:prstGeom prst="rect">
-              <a:avLst/>
-            </a:prstGeom>
-            <a:noFill/>
-            <a:ln>
-              <a:noFill/>
-            </a:ln>
-          </p:spPr>
-        </p:pic>
-        <p:pic>
-          <p:nvPicPr>
-            <p:cNvPr id="337" name="Google Shape;337;p20"/>
-            <p:cNvPicPr preferRelativeResize="0"/>
-            <p:nvPr/>
-          </p:nvPicPr>
-          <p:blipFill rotWithShape="1">
-            <a:blip r:embed="rId3">
-              <a:alphaModFix amt="80000"/>
-            </a:blip>
-            <a:srcRect b="0" l="0" r="0" t="0"/>
-            <a:stretch/>
-          </p:blipFill>
-          <p:spPr>
-            <a:xfrm>
-              <a:off x="13408776" y="0"/>
-              <a:ext cx="2891870" cy="2689440"/>
-            </a:xfrm>
-            <a:prstGeom prst="rect">
-              <a:avLst/>
-            </a:prstGeom>
-            <a:noFill/>
-            <a:ln>
-              <a:noFill/>
-            </a:ln>
-          </p:spPr>
-        </p:pic>
-        <p:pic>
-          <p:nvPicPr>
-            <p:cNvPr id="338" name="Google Shape;338;p20"/>
-            <p:cNvPicPr preferRelativeResize="0"/>
-            <p:nvPr/>
-          </p:nvPicPr>
-          <p:blipFill rotWithShape="1">
-            <a:blip r:embed="rId3">
-              <a:alphaModFix amt="80000"/>
-            </a:blip>
-            <a:srcRect b="0" l="0" r="0" t="0"/>
-            <a:stretch/>
-          </p:blipFill>
-          <p:spPr>
-            <a:xfrm>
-              <a:off x="10056582" y="0"/>
-              <a:ext cx="2891870" cy="2689440"/>
-            </a:xfrm>
-            <a:prstGeom prst="rect">
-              <a:avLst/>
-            </a:prstGeom>
-            <a:noFill/>
-            <a:ln>
-              <a:noFill/>
-            </a:ln>
-          </p:spPr>
-        </p:pic>
         <p:pic>
           <p:nvPicPr>
             <p:cNvPr id="339" name="Google Shape;339;p20"/>
@@ -25345,7 +23835,7 @@
           </p:blipFill>
           <p:spPr>
             <a:xfrm>
-              <a:off x="20113163" y="0"/>
+              <a:off x="16760969" y="0"/>
               <a:ext cx="2891870" cy="2689440"/>
             </a:xfrm>
             <a:prstGeom prst="rect">
@@ -25372,7 +23862,7 @@
           </p:blipFill>
           <p:spPr>
             <a:xfrm>
-              <a:off x="6704388" y="0"/>
+              <a:off x="13408776" y="0"/>
               <a:ext cx="2891870" cy="2689440"/>
             </a:xfrm>
             <a:prstGeom prst="rect">
@@ -25399,7 +23889,7 @@
           </p:blipFill>
           <p:spPr>
             <a:xfrm>
-              <a:off x="3352194" y="0"/>
+              <a:off x="10056582" y="0"/>
               <a:ext cx="2891870" cy="2689440"/>
             </a:xfrm>
             <a:prstGeom prst="rect">
@@ -25426,6 +23916,87 @@
           </p:blipFill>
           <p:spPr>
             <a:xfrm>
+              <a:off x="20113163" y="0"/>
+              <a:ext cx="2891870" cy="2689440"/>
+            </a:xfrm>
+            <a:prstGeom prst="rect">
+              <a:avLst/>
+            </a:prstGeom>
+            <a:noFill/>
+            <a:ln>
+              <a:noFill/>
+            </a:ln>
+          </p:spPr>
+        </p:pic>
+        <p:pic>
+          <p:nvPicPr>
+            <p:cNvPr id="343" name="Google Shape;343;p20"/>
+            <p:cNvPicPr preferRelativeResize="0"/>
+            <p:nvPr/>
+          </p:nvPicPr>
+          <p:blipFill rotWithShape="1">
+            <a:blip r:embed="rId3">
+              <a:alphaModFix amt="80000"/>
+            </a:blip>
+            <a:srcRect b="0" l="0" r="0" t="0"/>
+            <a:stretch/>
+          </p:blipFill>
+          <p:spPr>
+            <a:xfrm>
+              <a:off x="6704388" y="0"/>
+              <a:ext cx="2891870" cy="2689440"/>
+            </a:xfrm>
+            <a:prstGeom prst="rect">
+              <a:avLst/>
+            </a:prstGeom>
+            <a:noFill/>
+            <a:ln>
+              <a:noFill/>
+            </a:ln>
+          </p:spPr>
+        </p:pic>
+        <p:pic>
+          <p:nvPicPr>
+            <p:cNvPr id="344" name="Google Shape;344;p20"/>
+            <p:cNvPicPr preferRelativeResize="0"/>
+            <p:nvPr/>
+          </p:nvPicPr>
+          <p:blipFill rotWithShape="1">
+            <a:blip r:embed="rId3">
+              <a:alphaModFix amt="80000"/>
+            </a:blip>
+            <a:srcRect b="0" l="0" r="0" t="0"/>
+            <a:stretch/>
+          </p:blipFill>
+          <p:spPr>
+            <a:xfrm>
+              <a:off x="3352194" y="0"/>
+              <a:ext cx="2891870" cy="2689440"/>
+            </a:xfrm>
+            <a:prstGeom prst="rect">
+              <a:avLst/>
+            </a:prstGeom>
+            <a:noFill/>
+            <a:ln>
+              <a:noFill/>
+            </a:ln>
+          </p:spPr>
+        </p:pic>
+        <p:pic>
+          <p:nvPicPr>
+            <p:cNvPr id="345" name="Google Shape;345;p20"/>
+            <p:cNvPicPr preferRelativeResize="0"/>
+            <p:nvPr/>
+          </p:nvPicPr>
+          <p:blipFill rotWithShape="1">
+            <a:blip r:embed="rId3">
+              <a:alphaModFix amt="80000"/>
+            </a:blip>
+            <a:srcRect b="0" l="0" r="0" t="0"/>
+            <a:stretch/>
+          </p:blipFill>
+          <p:spPr>
+            <a:xfrm>
               <a:off x="0" y="0"/>
               <a:ext cx="2891870" cy="2689440"/>
             </a:xfrm>
@@ -25441,7 +24012,7 @@
       </p:grpSp>
       <p:sp>
         <p:nvSpPr>
-          <p:cNvPr id="343" name="Google Shape;343;p20"/>
+          <p:cNvPr id="346" name="Google Shape;346;p20"/>
           <p:cNvSpPr/>
           <p:nvPr/>
         </p:nvSpPr>
@@ -25484,7 +24055,7 @@
       </p:sp>
       <p:grpSp>
         <p:nvGrpSpPr>
-          <p:cNvPr id="344" name="Google Shape;344;p20"/>
+          <p:cNvPr id="347" name="Google Shape;347;p20"/>
           <p:cNvGrpSpPr/>
           <p:nvPr/>
         </p:nvGrpSpPr>
@@ -25498,7 +24069,7 @@
         </p:grpSpPr>
         <p:sp>
           <p:nvSpPr>
-            <p:cNvPr id="345" name="Google Shape;345;p20"/>
+            <p:cNvPr id="348" name="Google Shape;348;p20"/>
             <p:cNvSpPr/>
             <p:nvPr/>
           </p:nvSpPr>
@@ -25569,7 +24140,7 @@
         </p:sp>
         <p:pic>
           <p:nvPicPr>
-            <p:cNvPr id="346" name="Google Shape;346;p20"/>
+            <p:cNvPr id="349" name="Google Shape;349;p20"/>
             <p:cNvPicPr preferRelativeResize="0"/>
             <p:nvPr/>
           </p:nvPicPr>
@@ -25597,7 +24168,7 @@
       </p:grpSp>
       <p:pic>
         <p:nvPicPr>
-          <p:cNvPr id="347" name="Google Shape;347;p20" title="Chart"/>
+          <p:cNvPr id="350" name="Google Shape;350;p20" title="Chart"/>
           <p:cNvPicPr preferRelativeResize="0"/>
           <p:nvPr/>
         </p:nvPicPr>
@@ -25611,8 +24182,8 @@
         </p:blipFill>
         <p:spPr>
           <a:xfrm>
-            <a:off x="3142700" y="2850275"/>
-            <a:ext cx="7417425" cy="4586450"/>
+            <a:off x="11261091" y="3048750"/>
+            <a:ext cx="6648444" cy="5064799"/>
           </a:xfrm>
           <a:prstGeom prst="rect">
             <a:avLst/>
@@ -25623,9 +24194,59 @@
           </a:ln>
         </p:spPr>
       </p:pic>
+      <p:sp>
+        <p:nvSpPr>
+          <p:cNvPr id="351" name="Google Shape;351;p20"/>
+          <p:cNvSpPr txBox="1"/>
+          <p:nvPr/>
+        </p:nvSpPr>
+        <p:spPr>
+          <a:xfrm>
+            <a:off x="3049475" y="1103875"/>
+            <a:ext cx="12365400" cy="1416000"/>
+          </a:xfrm>
+          <a:prstGeom prst="rect">
+            <a:avLst/>
+          </a:prstGeom>
+          <a:noFill/>
+          <a:ln>
+            <a:noFill/>
+          </a:ln>
+        </p:spPr>
+        <p:txBody>
+          <a:bodyPr anchorCtr="0" anchor="t" bIns="91425" lIns="91425" spcFirstLastPara="1" rIns="91425" wrap="square" tIns="91425">
+            <a:spAutoFit/>
+          </a:bodyPr>
+          <a:lstStyle/>
+          <a:p>
+            <a:pPr indent="0" lvl="0" marL="0" rtl="0" algn="l">
+              <a:spcBef>
+                <a:spcPts val="0"/>
+              </a:spcBef>
+              <a:spcAft>
+                <a:spcPts val="0"/>
+              </a:spcAft>
+              <a:buNone/>
+            </a:pPr>
+            <a:r>
+              <a:rPr lang="cs-CZ" sz="8000">
+                <a:solidFill>
+                  <a:schemeClr val="dk1"/>
+                </a:solidFill>
+              </a:rPr>
+              <a:t>Popular Categories</a:t>
+            </a:r>
+            <a:endParaRPr sz="8000">
+              <a:solidFill>
+                <a:schemeClr val="dk1"/>
+              </a:solidFill>
+            </a:endParaRPr>
+          </a:p>
+        </p:txBody>
+      </p:sp>
       <p:pic>
         <p:nvPicPr>
-          <p:cNvPr id="348" name="Google Shape;348;p20" title="Chart"/>
+          <p:cNvPr id="352" name="Google Shape;352;p20" title="Chart"/>
           <p:cNvPicPr preferRelativeResize="0"/>
           <p:nvPr/>
         </p:nvPicPr>
@@ -25639,8 +24260,8 @@
         </p:blipFill>
         <p:spPr>
           <a:xfrm>
-            <a:off x="11412587" y="2850275"/>
-            <a:ext cx="6020501" cy="4586450"/>
+            <a:off x="2652525" y="3060042"/>
+            <a:ext cx="8191074" cy="5064790"/>
           </a:xfrm>
           <a:prstGeom prst="rect">
             <a:avLst/>
@@ -25651,188 +24272,6 @@
           </a:ln>
         </p:spPr>
       </p:pic>
-      <p:sp>
-        <p:nvSpPr>
-          <p:cNvPr id="349" name="Google Shape;349;p20"/>
-          <p:cNvSpPr txBox="1"/>
-          <p:nvPr/>
-        </p:nvSpPr>
-        <p:spPr>
-          <a:xfrm>
-            <a:off x="3049475" y="1103875"/>
-            <a:ext cx="12365400" cy="1416000"/>
-          </a:xfrm>
-          <a:prstGeom prst="rect">
-            <a:avLst/>
-          </a:prstGeom>
-          <a:noFill/>
-          <a:ln>
-            <a:noFill/>
-          </a:ln>
-        </p:spPr>
-        <p:txBody>
-          <a:bodyPr anchorCtr="0" anchor="t" bIns="91425" lIns="91425" spcFirstLastPara="1" rIns="91425" wrap="square" tIns="91425">
-            <a:spAutoFit/>
-          </a:bodyPr>
-          <a:lstStyle/>
-          <a:p>
-            <a:pPr indent="0" lvl="0" marL="0" rtl="0" algn="l">
-              <a:spcBef>
-                <a:spcPts val="0"/>
-              </a:spcBef>
-              <a:spcAft>
-                <a:spcPts val="0"/>
-              </a:spcAft>
-              <a:buNone/>
-            </a:pPr>
-            <a:r>
-              <a:rPr lang="cs-CZ" sz="8000">
-                <a:solidFill>
-                  <a:schemeClr val="dk1"/>
-                </a:solidFill>
-              </a:rPr>
-              <a:t>Popular Categories Insight</a:t>
-            </a:r>
-            <a:endParaRPr sz="8000">
-              <a:solidFill>
-                <a:schemeClr val="dk1"/>
-              </a:solidFill>
-            </a:endParaRPr>
-          </a:p>
-        </p:txBody>
-      </p:sp>
-      <p:sp>
-        <p:nvSpPr>
-          <p:cNvPr id="350" name="Google Shape;350;p20"/>
-          <p:cNvSpPr txBox="1"/>
-          <p:nvPr/>
-        </p:nvSpPr>
-        <p:spPr>
-          <a:xfrm>
-            <a:off x="3265000" y="7767125"/>
-            <a:ext cx="7312500" cy="1385400"/>
-          </a:xfrm>
-          <a:prstGeom prst="rect">
-            <a:avLst/>
-          </a:prstGeom>
-          <a:noFill/>
-          <a:ln>
-            <a:noFill/>
-          </a:ln>
-        </p:spPr>
-        <p:txBody>
-          <a:bodyPr anchorCtr="0" anchor="t" bIns="91425" lIns="91425" spcFirstLastPara="1" rIns="91425" wrap="square" tIns="91425">
-            <a:spAutoFit/>
-          </a:bodyPr>
-          <a:lstStyle/>
-          <a:p>
-            <a:pPr indent="0" lvl="0" marL="0" rtl="0" algn="l">
-              <a:spcBef>
-                <a:spcPts val="0"/>
-              </a:spcBef>
-              <a:spcAft>
-                <a:spcPts val="0"/>
-              </a:spcAft>
-              <a:buNone/>
-            </a:pPr>
-            <a:r>
-              <a:rPr lang="cs-CZ" sz="2600">
-                <a:solidFill>
-                  <a:schemeClr val="dk1"/>
-                </a:solidFill>
-              </a:rPr>
-              <a:t>Top 5 categories all nearly reach or exceed 50,000 in popularity score. Travel being the highest at 53,935 in popularity score</a:t>
-            </a:r>
-            <a:endParaRPr sz="2600">
-              <a:solidFill>
-                <a:schemeClr val="dk1"/>
-              </a:solidFill>
-            </a:endParaRPr>
-          </a:p>
-        </p:txBody>
-      </p:sp>
-      <p:sp>
-        <p:nvSpPr>
-          <p:cNvPr id="351" name="Google Shape;351;p20"/>
-          <p:cNvSpPr txBox="1"/>
-          <p:nvPr/>
-        </p:nvSpPr>
-        <p:spPr>
-          <a:xfrm>
-            <a:off x="11455999" y="7767125"/>
-            <a:ext cx="5933700" cy="1785600"/>
-          </a:xfrm>
-          <a:prstGeom prst="rect">
-            <a:avLst/>
-          </a:prstGeom>
-          <a:noFill/>
-          <a:ln>
-            <a:noFill/>
-          </a:ln>
-        </p:spPr>
-        <p:txBody>
-          <a:bodyPr anchorCtr="0" anchor="t" bIns="91425" lIns="91425" spcFirstLastPara="1" rIns="91425" wrap="square" tIns="91425">
-            <a:spAutoFit/>
-          </a:bodyPr>
-          <a:lstStyle/>
-          <a:p>
-            <a:pPr indent="0" lvl="0" marL="0" rtl="0" algn="l">
-              <a:spcBef>
-                <a:spcPts val="0"/>
-              </a:spcBef>
-              <a:spcAft>
-                <a:spcPts val="0"/>
-              </a:spcAft>
-              <a:buNone/>
-            </a:pPr>
-            <a:r>
-              <a:rPr lang="cs-CZ" sz="2600">
-                <a:solidFill>
-                  <a:schemeClr val="dk1"/>
-                </a:solidFill>
-              </a:rPr>
-              <a:t>Popular categories perform almost similar in reaction types. H</a:t>
-            </a:r>
-            <a:r>
-              <a:rPr lang="cs-CZ" sz="2600">
-                <a:solidFill>
-                  <a:schemeClr val="dk1"/>
-                </a:solidFill>
-              </a:rPr>
-              <a:t>owever, h</a:t>
-            </a:r>
-            <a:r>
-              <a:rPr lang="cs-CZ" sz="2600">
-                <a:solidFill>
-                  <a:schemeClr val="dk1"/>
-                </a:solidFill>
-              </a:rPr>
-              <a:t>ealthy eating and science is higher </a:t>
-            </a:r>
-            <a:r>
-              <a:rPr lang="cs-CZ" sz="2600">
-                <a:solidFill>
-                  <a:schemeClr val="dk1"/>
-                </a:solidFill>
-              </a:rPr>
-              <a:t>in positive reactions </a:t>
-            </a:r>
-            <a:r>
-              <a:rPr lang="cs-CZ" sz="2600">
-                <a:solidFill>
-                  <a:schemeClr val="dk1"/>
-                </a:solidFill>
-              </a:rPr>
-              <a:t>by 1-2%</a:t>
-            </a:r>
-            <a:endParaRPr sz="2600">
-              <a:solidFill>
-                <a:schemeClr val="dk1"/>
-              </a:solidFill>
-            </a:endParaRPr>
-          </a:p>
-        </p:txBody>
-      </p:sp>
     </p:spTree>
   </p:cSld>
   <p:clrMapOvr>
@@ -25846,7 +24285,7 @@
   <p:cSld>
     <p:spTree>
       <p:nvGrpSpPr>
-        <p:cNvPr id="359" name="Shape 359"/>
+        <p:cNvPr id="360" name="Shape 360"/>
         <p:cNvGrpSpPr/>
         <p:nvPr/>
       </p:nvGrpSpPr>
@@ -25860,7 +24299,7 @@
       </p:grpSpPr>
       <p:grpSp>
         <p:nvGrpSpPr>
-          <p:cNvPr id="360" name="Google Shape;360;p21"/>
+          <p:cNvPr id="361" name="Google Shape;361;p21"/>
           <p:cNvGrpSpPr/>
           <p:nvPr/>
         </p:nvGrpSpPr>
@@ -25872,33 +24311,6 @@
             <a:chExt cx="23005033" cy="2689440"/>
           </a:xfrm>
         </p:grpSpPr>
-        <p:pic>
-          <p:nvPicPr>
-            <p:cNvPr id="361" name="Google Shape;361;p21"/>
-            <p:cNvPicPr preferRelativeResize="0"/>
-            <p:nvPr/>
-          </p:nvPicPr>
-          <p:blipFill rotWithShape="1">
-            <a:blip r:embed="rId3">
-              <a:alphaModFix amt="80000"/>
-            </a:blip>
-            <a:srcRect b="0" l="0" r="0" t="0"/>
-            <a:stretch/>
-          </p:blipFill>
-          <p:spPr>
-            <a:xfrm>
-              <a:off x="16760969" y="0"/>
-              <a:ext cx="2891870" cy="2689440"/>
-            </a:xfrm>
-            <a:prstGeom prst="rect">
-              <a:avLst/>
-            </a:prstGeom>
-            <a:noFill/>
-            <a:ln>
-              <a:noFill/>
-            </a:ln>
-          </p:spPr>
-        </p:pic>
         <p:pic>
           <p:nvPicPr>
             <p:cNvPr id="362" name="Google Shape;362;p21"/>
@@ -25914,7 +24326,7 @@
           </p:blipFill>
           <p:spPr>
             <a:xfrm>
-              <a:off x="13408776" y="0"/>
+              <a:off x="16760969" y="0"/>
               <a:ext cx="2891870" cy="2689440"/>
             </a:xfrm>
             <a:prstGeom prst="rect">
@@ -25941,7 +24353,7 @@
           </p:blipFill>
           <p:spPr>
             <a:xfrm>
-              <a:off x="10056582" y="0"/>
+              <a:off x="13408776" y="0"/>
               <a:ext cx="2891870" cy="2689440"/>
             </a:xfrm>
             <a:prstGeom prst="rect">
@@ -25968,7 +24380,7 @@
           </p:blipFill>
           <p:spPr>
             <a:xfrm>
-              <a:off x="20113163" y="0"/>
+              <a:off x="10056582" y="0"/>
               <a:ext cx="2891870" cy="2689440"/>
             </a:xfrm>
             <a:prstGeom prst="rect">
@@ -25995,7 +24407,7 @@
           </p:blipFill>
           <p:spPr>
             <a:xfrm>
-              <a:off x="6704388" y="0"/>
+              <a:off x="20113163" y="0"/>
               <a:ext cx="2891870" cy="2689440"/>
             </a:xfrm>
             <a:prstGeom prst="rect">
@@ -26022,7 +24434,7 @@
           </p:blipFill>
           <p:spPr>
             <a:xfrm>
-              <a:off x="3352194" y="0"/>
+              <a:off x="6704388" y="0"/>
               <a:ext cx="2891870" cy="2689440"/>
             </a:xfrm>
             <a:prstGeom prst="rect">
@@ -26049,6 +24461,33 @@
           </p:blipFill>
           <p:spPr>
             <a:xfrm>
+              <a:off x="3352194" y="0"/>
+              <a:ext cx="2891870" cy="2689440"/>
+            </a:xfrm>
+            <a:prstGeom prst="rect">
+              <a:avLst/>
+            </a:prstGeom>
+            <a:noFill/>
+            <a:ln>
+              <a:noFill/>
+            </a:ln>
+          </p:spPr>
+        </p:pic>
+        <p:pic>
+          <p:nvPicPr>
+            <p:cNvPr id="368" name="Google Shape;368;p21"/>
+            <p:cNvPicPr preferRelativeResize="0"/>
+            <p:nvPr/>
+          </p:nvPicPr>
+          <p:blipFill rotWithShape="1">
+            <a:blip r:embed="rId3">
+              <a:alphaModFix amt="80000"/>
+            </a:blip>
+            <a:srcRect b="0" l="0" r="0" t="0"/>
+            <a:stretch/>
+          </p:blipFill>
+          <p:spPr>
+            <a:xfrm>
               <a:off x="0" y="0"/>
               <a:ext cx="2891870" cy="2689440"/>
             </a:xfrm>
@@ -26064,7 +24503,7 @@
       </p:grpSp>
       <p:grpSp>
         <p:nvGrpSpPr>
-          <p:cNvPr id="368" name="Google Shape;368;p21"/>
+          <p:cNvPr id="369" name="Google Shape;369;p21"/>
           <p:cNvGrpSpPr/>
           <p:nvPr/>
         </p:nvGrpSpPr>
@@ -26078,7 +24517,7 @@
         </p:grpSpPr>
         <p:sp>
           <p:nvSpPr>
-            <p:cNvPr id="369" name="Google Shape;369;p21"/>
+            <p:cNvPr id="370" name="Google Shape;370;p21"/>
             <p:cNvSpPr/>
             <p:nvPr/>
           </p:nvSpPr>
@@ -26149,7 +24588,7 @@
         </p:sp>
         <p:pic>
           <p:nvPicPr>
-            <p:cNvPr id="370" name="Google Shape;370;p21"/>
+            <p:cNvPr id="371" name="Google Shape;371;p21"/>
             <p:cNvPicPr preferRelativeResize="0"/>
             <p:nvPr/>
           </p:nvPicPr>
@@ -26177,7 +24616,7 @@
       </p:grpSp>
       <p:grpSp>
         <p:nvGrpSpPr>
-          <p:cNvPr id="371" name="Google Shape;371;p21"/>
+          <p:cNvPr id="372" name="Google Shape;372;p21"/>
           <p:cNvGrpSpPr/>
           <p:nvPr/>
         </p:nvGrpSpPr>
@@ -26189,33 +24628,6 @@
             <a:chExt cx="23005033" cy="2689440"/>
           </a:xfrm>
         </p:grpSpPr>
-        <p:pic>
-          <p:nvPicPr>
-            <p:cNvPr id="372" name="Google Shape;372;p21"/>
-            <p:cNvPicPr preferRelativeResize="0"/>
-            <p:nvPr/>
-          </p:nvPicPr>
-          <p:blipFill rotWithShape="1">
-            <a:blip r:embed="rId3">
-              <a:alphaModFix amt="80000"/>
-            </a:blip>
-            <a:srcRect b="0" l="0" r="0" t="0"/>
-            <a:stretch/>
-          </p:blipFill>
-          <p:spPr>
-            <a:xfrm>
-              <a:off x="16760969" y="0"/>
-              <a:ext cx="2891870" cy="2689440"/>
-            </a:xfrm>
-            <a:prstGeom prst="rect">
-              <a:avLst/>
-            </a:prstGeom>
-            <a:noFill/>
-            <a:ln>
-              <a:noFill/>
-            </a:ln>
-          </p:spPr>
-        </p:pic>
         <p:pic>
           <p:nvPicPr>
             <p:cNvPr id="373" name="Google Shape;373;p21"/>
@@ -26231,7 +24643,7 @@
           </p:blipFill>
           <p:spPr>
             <a:xfrm>
-              <a:off x="13408776" y="0"/>
+              <a:off x="16760969" y="0"/>
               <a:ext cx="2891870" cy="2689440"/>
             </a:xfrm>
             <a:prstGeom prst="rect">
@@ -26258,7 +24670,7 @@
           </p:blipFill>
           <p:spPr>
             <a:xfrm>
-              <a:off x="10056582" y="0"/>
+              <a:off x="13408776" y="0"/>
               <a:ext cx="2891870" cy="2689440"/>
             </a:xfrm>
             <a:prstGeom prst="rect">
@@ -26285,7 +24697,7 @@
           </p:blipFill>
           <p:spPr>
             <a:xfrm>
-              <a:off x="20113163" y="0"/>
+              <a:off x="10056582" y="0"/>
               <a:ext cx="2891870" cy="2689440"/>
             </a:xfrm>
             <a:prstGeom prst="rect">
@@ -26312,7 +24724,7 @@
           </p:blipFill>
           <p:spPr>
             <a:xfrm>
-              <a:off x="6704388" y="0"/>
+              <a:off x="20113163" y="0"/>
               <a:ext cx="2891870" cy="2689440"/>
             </a:xfrm>
             <a:prstGeom prst="rect">
@@ -26339,7 +24751,7 @@
           </p:blipFill>
           <p:spPr>
             <a:xfrm>
-              <a:off x="3352194" y="0"/>
+              <a:off x="6704388" y="0"/>
               <a:ext cx="2891870" cy="2689440"/>
             </a:xfrm>
             <a:prstGeom prst="rect">
@@ -26366,6 +24778,33 @@
           </p:blipFill>
           <p:spPr>
             <a:xfrm>
+              <a:off x="3352194" y="0"/>
+              <a:ext cx="2891870" cy="2689440"/>
+            </a:xfrm>
+            <a:prstGeom prst="rect">
+              <a:avLst/>
+            </a:prstGeom>
+            <a:noFill/>
+            <a:ln>
+              <a:noFill/>
+            </a:ln>
+          </p:spPr>
+        </p:pic>
+        <p:pic>
+          <p:nvPicPr>
+            <p:cNvPr id="379" name="Google Shape;379;p21"/>
+            <p:cNvPicPr preferRelativeResize="0"/>
+            <p:nvPr/>
+          </p:nvPicPr>
+          <p:blipFill rotWithShape="1">
+            <a:blip r:embed="rId3">
+              <a:alphaModFix amt="80000"/>
+            </a:blip>
+            <a:srcRect b="0" l="0" r="0" t="0"/>
+            <a:stretch/>
+          </p:blipFill>
+          <p:spPr>
+            <a:xfrm>
               <a:off x="0" y="0"/>
               <a:ext cx="2891870" cy="2689440"/>
             </a:xfrm>
@@ -26381,7 +24820,7 @@
       </p:grpSp>
       <p:sp>
         <p:nvSpPr>
-          <p:cNvPr id="379" name="Google Shape;379;p21"/>
+          <p:cNvPr id="380" name="Google Shape;380;p21"/>
           <p:cNvSpPr/>
           <p:nvPr/>
         </p:nvSpPr>
@@ -26424,7 +24863,7 @@
       </p:sp>
       <p:grpSp>
         <p:nvGrpSpPr>
-          <p:cNvPr id="380" name="Google Shape;380;p21"/>
+          <p:cNvPr id="381" name="Google Shape;381;p21"/>
           <p:cNvGrpSpPr/>
           <p:nvPr/>
         </p:nvGrpSpPr>
@@ -26438,7 +24877,7 @@
         </p:grpSpPr>
         <p:sp>
           <p:nvSpPr>
-            <p:cNvPr id="381" name="Google Shape;381;p21"/>
+            <p:cNvPr id="382" name="Google Shape;382;p21"/>
             <p:cNvSpPr/>
             <p:nvPr/>
           </p:nvSpPr>
@@ -26509,7 +24948,7 @@
         </p:sp>
         <p:pic>
           <p:nvPicPr>
-            <p:cNvPr id="382" name="Google Shape;382;p21"/>
+            <p:cNvPr id="383" name="Google Shape;383;p21"/>
             <p:cNvPicPr preferRelativeResize="0"/>
             <p:nvPr/>
           </p:nvPicPr>
@@ -26535,9 +24974,59 @@
           </p:spPr>
         </p:pic>
       </p:grpSp>
+      <p:sp>
+        <p:nvSpPr>
+          <p:cNvPr id="384" name="Google Shape;384;p21"/>
+          <p:cNvSpPr txBox="1"/>
+          <p:nvPr/>
+        </p:nvSpPr>
+        <p:spPr>
+          <a:xfrm>
+            <a:off x="3049475" y="1103875"/>
+            <a:ext cx="14312700" cy="1416000"/>
+          </a:xfrm>
+          <a:prstGeom prst="rect">
+            <a:avLst/>
+          </a:prstGeom>
+          <a:noFill/>
+          <a:ln>
+            <a:noFill/>
+          </a:ln>
+        </p:spPr>
+        <p:txBody>
+          <a:bodyPr anchorCtr="0" anchor="t" bIns="91425" lIns="91425" spcFirstLastPara="1" rIns="91425" wrap="square" tIns="91425">
+            <a:spAutoFit/>
+          </a:bodyPr>
+          <a:lstStyle/>
+          <a:p>
+            <a:pPr indent="0" lvl="0" marL="0" rtl="0" algn="l">
+              <a:spcBef>
+                <a:spcPts val="0"/>
+              </a:spcBef>
+              <a:spcAft>
+                <a:spcPts val="0"/>
+              </a:spcAft>
+              <a:buNone/>
+            </a:pPr>
+            <a:r>
+              <a:rPr lang="cs-CZ" sz="8000">
+                <a:solidFill>
+                  <a:schemeClr val="dk1"/>
+                </a:solidFill>
+              </a:rPr>
+              <a:t>Content Type and Categories</a:t>
+            </a:r>
+            <a:endParaRPr sz="8000">
+              <a:solidFill>
+                <a:schemeClr val="dk1"/>
+              </a:solidFill>
+            </a:endParaRPr>
+          </a:p>
+        </p:txBody>
+      </p:sp>
       <p:pic>
         <p:nvPicPr>
-          <p:cNvPr id="383" name="Google Shape;383;p21" title="Chart"/>
+          <p:cNvPr id="385" name="Google Shape;385;p21" title="Chart"/>
           <p:cNvPicPr preferRelativeResize="0"/>
           <p:nvPr/>
         </p:nvPicPr>
@@ -26551,8 +25040,8 @@
         </p:blipFill>
         <p:spPr>
           <a:xfrm>
-            <a:off x="10727140" y="2970062"/>
-            <a:ext cx="7029969" cy="4346875"/>
+            <a:off x="2801063" y="2750250"/>
+            <a:ext cx="6927525" cy="5673050"/>
           </a:xfrm>
           <a:prstGeom prst="rect">
             <a:avLst/>
@@ -26563,215 +25052,9 @@
           </a:ln>
         </p:spPr>
       </p:pic>
-      <p:sp>
-        <p:nvSpPr>
-          <p:cNvPr id="384" name="Google Shape;384;p21"/>
-          <p:cNvSpPr txBox="1"/>
-          <p:nvPr/>
-        </p:nvSpPr>
-        <p:spPr>
-          <a:xfrm>
-            <a:off x="3049475" y="1103875"/>
-            <a:ext cx="9552900" cy="1416000"/>
-          </a:xfrm>
-          <a:prstGeom prst="rect">
-            <a:avLst/>
-          </a:prstGeom>
-          <a:noFill/>
-          <a:ln>
-            <a:noFill/>
-          </a:ln>
-        </p:spPr>
-        <p:txBody>
-          <a:bodyPr anchorCtr="0" anchor="t" bIns="91425" lIns="91425" spcFirstLastPara="1" rIns="91425" wrap="square" tIns="91425">
-            <a:spAutoFit/>
-          </a:bodyPr>
-          <a:lstStyle/>
-          <a:p>
-            <a:pPr indent="0" lvl="0" marL="0" rtl="0" algn="l">
-              <a:spcBef>
-                <a:spcPts val="0"/>
-              </a:spcBef>
-              <a:spcAft>
-                <a:spcPts val="0"/>
-              </a:spcAft>
-              <a:buNone/>
-            </a:pPr>
-            <a:r>
-              <a:rPr lang="cs-CZ" sz="8000">
-                <a:solidFill>
-                  <a:schemeClr val="dk1"/>
-                </a:solidFill>
-              </a:rPr>
-              <a:t>Content Type Insight</a:t>
-            </a:r>
-            <a:endParaRPr sz="8000">
-              <a:solidFill>
-                <a:schemeClr val="dk1"/>
-              </a:solidFill>
-            </a:endParaRPr>
-          </a:p>
-        </p:txBody>
-      </p:sp>
-      <p:sp>
-        <p:nvSpPr>
-          <p:cNvPr id="385" name="Google Shape;385;p21"/>
-          <p:cNvSpPr txBox="1"/>
-          <p:nvPr/>
-        </p:nvSpPr>
-        <p:spPr>
-          <a:xfrm>
-            <a:off x="3161100" y="7752800"/>
-            <a:ext cx="6639000" cy="1785600"/>
-          </a:xfrm>
-          <a:prstGeom prst="rect">
-            <a:avLst/>
-          </a:prstGeom>
-          <a:noFill/>
-          <a:ln>
-            <a:noFill/>
-          </a:ln>
-        </p:spPr>
-        <p:txBody>
-          <a:bodyPr anchorCtr="0" anchor="t" bIns="91425" lIns="91425" spcFirstLastPara="1" rIns="91425" wrap="square" tIns="91425">
-            <a:spAutoFit/>
-          </a:bodyPr>
-          <a:lstStyle/>
-          <a:p>
-            <a:pPr indent="0" lvl="0" marL="0" rtl="0" algn="l">
-              <a:spcBef>
-                <a:spcPts val="0"/>
-              </a:spcBef>
-              <a:spcAft>
-                <a:spcPts val="0"/>
-              </a:spcAft>
-              <a:buNone/>
-            </a:pPr>
-            <a:r>
-              <a:rPr lang="cs-CZ" sz="2600">
-                <a:solidFill>
-                  <a:schemeClr val="dk1"/>
-                </a:solidFill>
-              </a:rPr>
-              <a:t>Photo is highest in both popularity and amount of posts. It would also appear that the amount of posts and popularity have a </a:t>
-            </a:r>
-            <a:endParaRPr sz="2600">
-              <a:solidFill>
-                <a:schemeClr val="dk1"/>
-              </a:solidFill>
-            </a:endParaRPr>
-          </a:p>
-          <a:p>
-            <a:pPr indent="0" lvl="0" marL="0" rtl="0" algn="l">
-              <a:spcBef>
-                <a:spcPts val="0"/>
-              </a:spcBef>
-              <a:spcAft>
-                <a:spcPts val="0"/>
-              </a:spcAft>
-              <a:buNone/>
-            </a:pPr>
-            <a:r>
-              <a:rPr lang="cs-CZ" sz="2600">
-                <a:solidFill>
-                  <a:schemeClr val="dk1"/>
-                </a:solidFill>
-              </a:rPr>
-              <a:t>      </a:t>
-            </a:r>
-            <a:r>
-              <a:rPr lang="cs-CZ" sz="2600">
-                <a:solidFill>
-                  <a:schemeClr val="dk1"/>
-                </a:solidFill>
-              </a:rPr>
-              <a:t>positive</a:t>
-            </a:r>
-            <a:r>
-              <a:rPr lang="cs-CZ" sz="2600">
-                <a:solidFill>
-                  <a:schemeClr val="dk1"/>
-                </a:solidFill>
-              </a:rPr>
-              <a:t> correlation</a:t>
-            </a:r>
-            <a:endParaRPr sz="2600">
-              <a:solidFill>
-                <a:schemeClr val="dk1"/>
-              </a:solidFill>
-            </a:endParaRPr>
-          </a:p>
-        </p:txBody>
-      </p:sp>
-      <p:sp>
-        <p:nvSpPr>
-          <p:cNvPr id="386" name="Google Shape;386;p21"/>
-          <p:cNvSpPr txBox="1"/>
-          <p:nvPr/>
-        </p:nvSpPr>
-        <p:spPr>
-          <a:xfrm>
-            <a:off x="10922625" y="7752800"/>
-            <a:ext cx="6639000" cy="1785600"/>
-          </a:xfrm>
-          <a:prstGeom prst="rect">
-            <a:avLst/>
-          </a:prstGeom>
-          <a:noFill/>
-          <a:ln>
-            <a:noFill/>
-          </a:ln>
-        </p:spPr>
-        <p:txBody>
-          <a:bodyPr anchorCtr="0" anchor="t" bIns="91425" lIns="91425" spcFirstLastPara="1" rIns="91425" wrap="square" tIns="91425">
-            <a:spAutoFit/>
-          </a:bodyPr>
-          <a:lstStyle/>
-          <a:p>
-            <a:pPr indent="0" lvl="0" marL="0" rtl="0" algn="l">
-              <a:spcBef>
-                <a:spcPts val="0"/>
-              </a:spcBef>
-              <a:spcAft>
-                <a:spcPts val="0"/>
-              </a:spcAft>
-              <a:buNone/>
-            </a:pPr>
-            <a:r>
-              <a:rPr lang="cs-CZ" sz="2600">
-                <a:solidFill>
-                  <a:schemeClr val="dk1"/>
-                </a:solidFill>
-              </a:rPr>
-              <a:t>The difference of % in negative reactions between content types is at most 0.4%. In </a:t>
-            </a:r>
-            <a:r>
-              <a:rPr lang="cs-CZ" sz="2600">
-                <a:solidFill>
-                  <a:schemeClr val="dk1"/>
-                </a:solidFill>
-              </a:rPr>
-              <a:t>positive</a:t>
-            </a:r>
-            <a:r>
-              <a:rPr lang="cs-CZ" sz="2600">
-                <a:solidFill>
-                  <a:schemeClr val="dk1"/>
-                </a:solidFill>
-              </a:rPr>
-              <a:t> reactions, GIF is the highest with photo being behind by 1%.</a:t>
-            </a:r>
-            <a:endParaRPr sz="2600">
-              <a:solidFill>
-                <a:schemeClr val="dk1"/>
-              </a:solidFill>
-            </a:endParaRPr>
-          </a:p>
-        </p:txBody>
-      </p:sp>
       <p:pic>
         <p:nvPicPr>
-          <p:cNvPr id="387" name="Google Shape;387;p21" title="Chart"/>
+          <p:cNvPr id="386" name="Google Shape;386;p21" title="Chart"/>
           <p:cNvPicPr preferRelativeResize="0"/>
           <p:nvPr/>
         </p:nvPicPr>
@@ -26785,36 +25068,8 @@
         </p:blipFill>
         <p:spPr>
           <a:xfrm>
-            <a:off x="2965600" y="2486070"/>
-            <a:ext cx="7029975" cy="2647960"/>
-          </a:xfrm>
-          <a:prstGeom prst="rect">
-            <a:avLst/>
-          </a:prstGeom>
-          <a:noFill/>
-          <a:ln>
-            <a:noFill/>
-          </a:ln>
-        </p:spPr>
-      </p:pic>
-      <p:pic>
-        <p:nvPicPr>
-          <p:cNvPr id="388" name="Google Shape;388;p21" title="Chart"/>
-          <p:cNvPicPr preferRelativeResize="0"/>
-          <p:nvPr/>
-        </p:nvPicPr>
-        <p:blipFill>
-          <a:blip r:embed="rId7">
-            <a:alphaModFix/>
-          </a:blip>
-          <a:stretch>
-            <a:fillRect/>
-          </a:stretch>
-        </p:blipFill>
-        <p:spPr>
-          <a:xfrm>
-            <a:off x="2965633" y="5134037"/>
-            <a:ext cx="7029933" cy="2647950"/>
+            <a:off x="10109590" y="2750263"/>
+            <a:ext cx="7861047" cy="5673049"/>
           </a:xfrm>
           <a:prstGeom prst="rect">
             <a:avLst/>

</xml_diff>